<commit_message>
Update slide deck theme
</commit_message>
<xml_diff>
--- a/odbc-with-r-overview.pptx
+++ b/odbc-with-r-overview.pptx
@@ -3,36 +3,37 @@
 <p:presentation xmlns:a="http://schemas.openxmlformats.org/drawingml/2006/main" xmlns:r="http://schemas.openxmlformats.org/officeDocument/2006/relationships" xmlns:p="http://schemas.openxmlformats.org/presentationml/2006/main" saveSubsetFonts="1">
   <p:sldMasterIdLst>
     <p:sldMasterId id="2147483660" r:id="rId1"/>
+    <p:sldMasterId id="2147483676" r:id="rId2"/>
   </p:sldMasterIdLst>
   <p:notesMasterIdLst>
-    <p:notesMasterId r:id="rId27"/>
+    <p:notesMasterId r:id="rId28"/>
   </p:notesMasterIdLst>
   <p:sldIdLst>
-    <p:sldId id="357" r:id="rId2"/>
-    <p:sldId id="279" r:id="rId3"/>
-    <p:sldId id="281" r:id="rId4"/>
-    <p:sldId id="280" r:id="rId5"/>
-    <p:sldId id="284" r:id="rId6"/>
-    <p:sldId id="283" r:id="rId7"/>
-    <p:sldId id="285" r:id="rId8"/>
-    <p:sldId id="313" r:id="rId9"/>
-    <p:sldId id="287" r:id="rId10"/>
-    <p:sldId id="289" r:id="rId11"/>
-    <p:sldId id="290" r:id="rId12"/>
-    <p:sldId id="295" r:id="rId13"/>
-    <p:sldId id="268" r:id="rId14"/>
-    <p:sldId id="267" r:id="rId15"/>
-    <p:sldId id="271" r:id="rId16"/>
-    <p:sldId id="278" r:id="rId17"/>
-    <p:sldId id="270" r:id="rId18"/>
-    <p:sldId id="273" r:id="rId19"/>
-    <p:sldId id="274" r:id="rId20"/>
-    <p:sldId id="277" r:id="rId21"/>
-    <p:sldId id="349" r:id="rId22"/>
-    <p:sldId id="356" r:id="rId23"/>
-    <p:sldId id="275" r:id="rId24"/>
-    <p:sldId id="346" r:id="rId25"/>
-    <p:sldId id="358" r:id="rId26"/>
+    <p:sldId id="357" r:id="rId3"/>
+    <p:sldId id="279" r:id="rId4"/>
+    <p:sldId id="281" r:id="rId5"/>
+    <p:sldId id="280" r:id="rId6"/>
+    <p:sldId id="284" r:id="rId7"/>
+    <p:sldId id="283" r:id="rId8"/>
+    <p:sldId id="285" r:id="rId9"/>
+    <p:sldId id="313" r:id="rId10"/>
+    <p:sldId id="287" r:id="rId11"/>
+    <p:sldId id="289" r:id="rId12"/>
+    <p:sldId id="290" r:id="rId13"/>
+    <p:sldId id="295" r:id="rId14"/>
+    <p:sldId id="268" r:id="rId15"/>
+    <p:sldId id="267" r:id="rId16"/>
+    <p:sldId id="271" r:id="rId17"/>
+    <p:sldId id="278" r:id="rId18"/>
+    <p:sldId id="270" r:id="rId19"/>
+    <p:sldId id="273" r:id="rId20"/>
+    <p:sldId id="274" r:id="rId21"/>
+    <p:sldId id="277" r:id="rId22"/>
+    <p:sldId id="349" r:id="rId23"/>
+    <p:sldId id="356" r:id="rId24"/>
+    <p:sldId id="275" r:id="rId25"/>
+    <p:sldId id="346" r:id="rId26"/>
+    <p:sldId id="358" r:id="rId27"/>
   </p:sldIdLst>
   <p:sldSz cx="12192000" cy="6858000"/>
   <p:notesSz cx="6858000" cy="9144000"/>
@@ -221,7 +222,7 @@
           <a:p>
             <a:fld id="{9EC16627-F366-41C3-9956-5EAEF440ABD8}" type="datetimeFigureOut">
               <a:rPr lang="en-US" smtClean="0"/>
-              <a:t>7/17/19</a:t>
+              <a:t>7/18/19</a:t>
             </a:fld>
             <a:endParaRPr lang="en-US" dirty="0"/>
           </a:p>
@@ -1827,6 +1828,965 @@
 </p:sldLayout>
 </file>
 
+<file path=ppt/slideLayouts/slideLayout16.xml><?xml version="1.0" encoding="utf-8"?>
+<p:sldLayout xmlns:a="http://schemas.openxmlformats.org/drawingml/2006/main" xmlns:r="http://schemas.openxmlformats.org/officeDocument/2006/relationships" xmlns:p="http://schemas.openxmlformats.org/presentationml/2006/main" type="title" preserve="1">
+  <p:cSld name="Title Slide">
+    <p:spTree>
+      <p:nvGrpSpPr>
+        <p:cNvPr id="1" name=""/>
+        <p:cNvGrpSpPr/>
+        <p:nvPr/>
+      </p:nvGrpSpPr>
+      <p:grpSpPr>
+        <a:xfrm>
+          <a:off x="0" y="0"/>
+          <a:ext cx="0" cy="0"/>
+          <a:chOff x="0" y="0"/>
+          <a:chExt cx="0" cy="0"/>
+        </a:xfrm>
+      </p:grpSpPr>
+      <p:sp>
+        <p:nvSpPr>
+          <p:cNvPr id="2" name="Title 1">
+            <a:extLst>
+              <a:ext uri="{FF2B5EF4-FFF2-40B4-BE49-F238E27FC236}">
+                <a16:creationId xmlns:a16="http://schemas.microsoft.com/office/drawing/2014/main" id="{9DDA2A7B-08EE-704F-8A1C-CE2D33B3E35C}"/>
+              </a:ext>
+            </a:extLst>
+          </p:cNvPr>
+          <p:cNvSpPr>
+            <a:spLocks noGrp="1"/>
+          </p:cNvSpPr>
+          <p:nvPr>
+            <p:ph type="ctrTitle"/>
+          </p:nvPr>
+        </p:nvSpPr>
+        <p:spPr>
+          <a:xfrm>
+            <a:off x="1524000" y="1122363"/>
+            <a:ext cx="9144000" cy="2387600"/>
+          </a:xfrm>
+        </p:spPr>
+        <p:txBody>
+          <a:bodyPr anchor="b"/>
+          <a:lstStyle>
+            <a:lvl1pPr algn="ctr">
+              <a:defRPr sz="6000"/>
+            </a:lvl1pPr>
+          </a:lstStyle>
+          <a:p>
+            <a:r>
+              <a:rPr lang="en-US"/>
+              <a:t>Click to edit Master title style</a:t>
+            </a:r>
+          </a:p>
+        </p:txBody>
+      </p:sp>
+      <p:sp>
+        <p:nvSpPr>
+          <p:cNvPr id="3" name="Subtitle 2">
+            <a:extLst>
+              <a:ext uri="{FF2B5EF4-FFF2-40B4-BE49-F238E27FC236}">
+                <a16:creationId xmlns:a16="http://schemas.microsoft.com/office/drawing/2014/main" id="{1A54E778-2060-4748-8BF5-AF6A08032B34}"/>
+              </a:ext>
+            </a:extLst>
+          </p:cNvPr>
+          <p:cNvSpPr>
+            <a:spLocks noGrp="1"/>
+          </p:cNvSpPr>
+          <p:nvPr>
+            <p:ph type="subTitle" idx="1"/>
+          </p:nvPr>
+        </p:nvSpPr>
+        <p:spPr>
+          <a:xfrm>
+            <a:off x="1524000" y="3602038"/>
+            <a:ext cx="9144000" cy="1655762"/>
+          </a:xfrm>
+        </p:spPr>
+        <p:txBody>
+          <a:bodyPr/>
+          <a:lstStyle>
+            <a:lvl1pPr marL="0" indent="0" algn="ctr">
+              <a:buNone/>
+              <a:defRPr sz="2400"/>
+            </a:lvl1pPr>
+            <a:lvl2pPr marL="457200" indent="0" algn="ctr">
+              <a:buNone/>
+              <a:defRPr sz="2000"/>
+            </a:lvl2pPr>
+            <a:lvl3pPr marL="914400" indent="0" algn="ctr">
+              <a:buNone/>
+              <a:defRPr sz="1800"/>
+            </a:lvl3pPr>
+            <a:lvl4pPr marL="1371600" indent="0" algn="ctr">
+              <a:buNone/>
+              <a:defRPr sz="1600"/>
+            </a:lvl4pPr>
+            <a:lvl5pPr marL="1828800" indent="0" algn="ctr">
+              <a:buNone/>
+              <a:defRPr sz="1600"/>
+            </a:lvl5pPr>
+            <a:lvl6pPr marL="2286000" indent="0" algn="ctr">
+              <a:buNone/>
+              <a:defRPr sz="1600"/>
+            </a:lvl6pPr>
+            <a:lvl7pPr marL="2743200" indent="0" algn="ctr">
+              <a:buNone/>
+              <a:defRPr sz="1600"/>
+            </a:lvl7pPr>
+            <a:lvl8pPr marL="3200400" indent="0" algn="ctr">
+              <a:buNone/>
+              <a:defRPr sz="1600"/>
+            </a:lvl8pPr>
+            <a:lvl9pPr marL="3657600" indent="0" algn="ctr">
+              <a:buNone/>
+              <a:defRPr sz="1600"/>
+            </a:lvl9pPr>
+          </a:lstStyle>
+          <a:p>
+            <a:r>
+              <a:rPr lang="en-US"/>
+              <a:t>Click to edit Master subtitle style</a:t>
+            </a:r>
+          </a:p>
+        </p:txBody>
+      </p:sp>
+      <p:sp>
+        <p:nvSpPr>
+          <p:cNvPr id="4" name="Date Placeholder 3">
+            <a:extLst>
+              <a:ext uri="{FF2B5EF4-FFF2-40B4-BE49-F238E27FC236}">
+                <a16:creationId xmlns:a16="http://schemas.microsoft.com/office/drawing/2014/main" id="{9A14213B-9FEA-464F-925B-D4F0F6B21740}"/>
+              </a:ext>
+            </a:extLst>
+          </p:cNvPr>
+          <p:cNvSpPr>
+            <a:spLocks noGrp="1"/>
+          </p:cNvSpPr>
+          <p:nvPr>
+            <p:ph type="dt" sz="half" idx="10"/>
+          </p:nvPr>
+        </p:nvSpPr>
+        <p:spPr/>
+        <p:txBody>
+          <a:bodyPr/>
+          <a:lstStyle/>
+          <a:p>
+            <a:fld id="{53FA46FA-1708-D043-B900-E932D5DF811C}" type="datetimeFigureOut">
+              <a:rPr lang="en-US" smtClean="0"/>
+              <a:t>7/18/19</a:t>
+            </a:fld>
+            <a:endParaRPr lang="en-US"/>
+          </a:p>
+        </p:txBody>
+      </p:sp>
+      <p:sp>
+        <p:nvSpPr>
+          <p:cNvPr id="5" name="Footer Placeholder 4">
+            <a:extLst>
+              <a:ext uri="{FF2B5EF4-FFF2-40B4-BE49-F238E27FC236}">
+                <a16:creationId xmlns:a16="http://schemas.microsoft.com/office/drawing/2014/main" id="{B7420BA8-18A9-C949-B90D-3D3B2DE7A520}"/>
+              </a:ext>
+            </a:extLst>
+          </p:cNvPr>
+          <p:cNvSpPr>
+            <a:spLocks noGrp="1"/>
+          </p:cNvSpPr>
+          <p:nvPr>
+            <p:ph type="ftr" sz="quarter" idx="11"/>
+          </p:nvPr>
+        </p:nvSpPr>
+        <p:spPr/>
+        <p:txBody>
+          <a:bodyPr/>
+          <a:lstStyle/>
+          <a:p>
+            <a:endParaRPr lang="en-US"/>
+          </a:p>
+        </p:txBody>
+      </p:sp>
+      <p:sp>
+        <p:nvSpPr>
+          <p:cNvPr id="6" name="Slide Number Placeholder 5">
+            <a:extLst>
+              <a:ext uri="{FF2B5EF4-FFF2-40B4-BE49-F238E27FC236}">
+                <a16:creationId xmlns:a16="http://schemas.microsoft.com/office/drawing/2014/main" id="{2DA99894-2388-B64C-A06C-93E9529EB006}"/>
+              </a:ext>
+            </a:extLst>
+          </p:cNvPr>
+          <p:cNvSpPr>
+            <a:spLocks noGrp="1"/>
+          </p:cNvSpPr>
+          <p:nvPr>
+            <p:ph type="sldNum" sz="quarter" idx="12"/>
+          </p:nvPr>
+        </p:nvSpPr>
+        <p:spPr/>
+        <p:txBody>
+          <a:bodyPr/>
+          <a:lstStyle/>
+          <a:p>
+            <a:fld id="{86CB4B4D-7CA3-9044-876B-883B54F8677D}" type="slidenum">
+              <a:rPr lang="en-US" smtClean="0"/>
+              <a:t>‹#›</a:t>
+            </a:fld>
+            <a:endParaRPr lang="en-US"/>
+          </a:p>
+        </p:txBody>
+      </p:sp>
+    </p:spTree>
+    <p:extLst>
+      <p:ext uri="{BB962C8B-B14F-4D97-AF65-F5344CB8AC3E}">
+        <p14:creationId xmlns:p14="http://schemas.microsoft.com/office/powerpoint/2010/main" val="2597389689"/>
+      </p:ext>
+    </p:extLst>
+  </p:cSld>
+  <p:clrMapOvr>
+    <a:masterClrMapping/>
+  </p:clrMapOvr>
+</p:sldLayout>
+</file>
+
+<file path=ppt/slideLayouts/slideLayout17.xml><?xml version="1.0" encoding="utf-8"?>
+<p:sldLayout xmlns:a="http://schemas.openxmlformats.org/drawingml/2006/main" xmlns:r="http://schemas.openxmlformats.org/officeDocument/2006/relationships" xmlns:p="http://schemas.openxmlformats.org/presentationml/2006/main" type="obj" preserve="1">
+  <p:cSld name="Title and Content">
+    <p:spTree>
+      <p:nvGrpSpPr>
+        <p:cNvPr id="1" name=""/>
+        <p:cNvGrpSpPr/>
+        <p:nvPr/>
+      </p:nvGrpSpPr>
+      <p:grpSpPr>
+        <a:xfrm>
+          <a:off x="0" y="0"/>
+          <a:ext cx="0" cy="0"/>
+          <a:chOff x="0" y="0"/>
+          <a:chExt cx="0" cy="0"/>
+        </a:xfrm>
+      </p:grpSpPr>
+      <p:sp>
+        <p:nvSpPr>
+          <p:cNvPr id="2" name="Title 1">
+            <a:extLst>
+              <a:ext uri="{FF2B5EF4-FFF2-40B4-BE49-F238E27FC236}">
+                <a16:creationId xmlns:a16="http://schemas.microsoft.com/office/drawing/2014/main" id="{69A75877-7F90-2244-A2D1-2CBC11670E96}"/>
+              </a:ext>
+            </a:extLst>
+          </p:cNvPr>
+          <p:cNvSpPr>
+            <a:spLocks noGrp="1"/>
+          </p:cNvSpPr>
+          <p:nvPr>
+            <p:ph type="title"/>
+          </p:nvPr>
+        </p:nvSpPr>
+        <p:spPr/>
+        <p:txBody>
+          <a:bodyPr/>
+          <a:lstStyle/>
+          <a:p>
+            <a:r>
+              <a:rPr lang="en-US"/>
+              <a:t>Click to edit Master title style</a:t>
+            </a:r>
+          </a:p>
+        </p:txBody>
+      </p:sp>
+      <p:sp>
+        <p:nvSpPr>
+          <p:cNvPr id="3" name="Content Placeholder 2">
+            <a:extLst>
+              <a:ext uri="{FF2B5EF4-FFF2-40B4-BE49-F238E27FC236}">
+                <a16:creationId xmlns:a16="http://schemas.microsoft.com/office/drawing/2014/main" id="{16A9822F-6D25-AE4C-8B58-71A45EAFA551}"/>
+              </a:ext>
+            </a:extLst>
+          </p:cNvPr>
+          <p:cNvSpPr>
+            <a:spLocks noGrp="1"/>
+          </p:cNvSpPr>
+          <p:nvPr>
+            <p:ph idx="1"/>
+          </p:nvPr>
+        </p:nvSpPr>
+        <p:spPr/>
+        <p:txBody>
+          <a:bodyPr/>
+          <a:lstStyle/>
+          <a:p>
+            <a:pPr lvl="0"/>
+            <a:r>
+              <a:rPr lang="en-US"/>
+              <a:t>Click to edit Master text styles</a:t>
+            </a:r>
+          </a:p>
+          <a:p>
+            <a:pPr lvl="1"/>
+            <a:r>
+              <a:rPr lang="en-US"/>
+              <a:t>Second level</a:t>
+            </a:r>
+          </a:p>
+          <a:p>
+            <a:pPr lvl="2"/>
+            <a:r>
+              <a:rPr lang="en-US"/>
+              <a:t>Third level</a:t>
+            </a:r>
+          </a:p>
+          <a:p>
+            <a:pPr lvl="3"/>
+            <a:r>
+              <a:rPr lang="en-US"/>
+              <a:t>Fourth level</a:t>
+            </a:r>
+          </a:p>
+          <a:p>
+            <a:pPr lvl="4"/>
+            <a:r>
+              <a:rPr lang="en-US"/>
+              <a:t>Fifth level</a:t>
+            </a:r>
+          </a:p>
+        </p:txBody>
+      </p:sp>
+      <p:sp>
+        <p:nvSpPr>
+          <p:cNvPr id="4" name="Date Placeholder 3">
+            <a:extLst>
+              <a:ext uri="{FF2B5EF4-FFF2-40B4-BE49-F238E27FC236}">
+                <a16:creationId xmlns:a16="http://schemas.microsoft.com/office/drawing/2014/main" id="{AC7F3CB6-2FE2-1C48-8B41-4AE01868BE14}"/>
+              </a:ext>
+            </a:extLst>
+          </p:cNvPr>
+          <p:cNvSpPr>
+            <a:spLocks noGrp="1"/>
+          </p:cNvSpPr>
+          <p:nvPr>
+            <p:ph type="dt" sz="half" idx="10"/>
+          </p:nvPr>
+        </p:nvSpPr>
+        <p:spPr/>
+        <p:txBody>
+          <a:bodyPr/>
+          <a:lstStyle/>
+          <a:p>
+            <a:fld id="{53FA46FA-1708-D043-B900-E932D5DF811C}" type="datetimeFigureOut">
+              <a:rPr lang="en-US" smtClean="0"/>
+              <a:t>7/18/19</a:t>
+            </a:fld>
+            <a:endParaRPr lang="en-US"/>
+          </a:p>
+        </p:txBody>
+      </p:sp>
+      <p:sp>
+        <p:nvSpPr>
+          <p:cNvPr id="5" name="Footer Placeholder 4">
+            <a:extLst>
+              <a:ext uri="{FF2B5EF4-FFF2-40B4-BE49-F238E27FC236}">
+                <a16:creationId xmlns:a16="http://schemas.microsoft.com/office/drawing/2014/main" id="{87FDF7C7-2B15-D54C-9024-F69FBDDED978}"/>
+              </a:ext>
+            </a:extLst>
+          </p:cNvPr>
+          <p:cNvSpPr>
+            <a:spLocks noGrp="1"/>
+          </p:cNvSpPr>
+          <p:nvPr>
+            <p:ph type="ftr" sz="quarter" idx="11"/>
+          </p:nvPr>
+        </p:nvSpPr>
+        <p:spPr/>
+        <p:txBody>
+          <a:bodyPr/>
+          <a:lstStyle/>
+          <a:p>
+            <a:endParaRPr lang="en-US"/>
+          </a:p>
+        </p:txBody>
+      </p:sp>
+      <p:sp>
+        <p:nvSpPr>
+          <p:cNvPr id="6" name="Slide Number Placeholder 5">
+            <a:extLst>
+              <a:ext uri="{FF2B5EF4-FFF2-40B4-BE49-F238E27FC236}">
+                <a16:creationId xmlns:a16="http://schemas.microsoft.com/office/drawing/2014/main" id="{1082F418-66CB-7449-826B-FCE0D1A327E3}"/>
+              </a:ext>
+            </a:extLst>
+          </p:cNvPr>
+          <p:cNvSpPr>
+            <a:spLocks noGrp="1"/>
+          </p:cNvSpPr>
+          <p:nvPr>
+            <p:ph type="sldNum" sz="quarter" idx="12"/>
+          </p:nvPr>
+        </p:nvSpPr>
+        <p:spPr/>
+        <p:txBody>
+          <a:bodyPr/>
+          <a:lstStyle/>
+          <a:p>
+            <a:fld id="{C4B75AB1-FC9F-4099-B600-BC5D3B8F4541}" type="slidenum">
+              <a:rPr lang="en-US" smtClean="0"/>
+              <a:pPr/>
+              <a:t>‹#›</a:t>
+            </a:fld>
+            <a:endParaRPr lang="en-US" dirty="0"/>
+          </a:p>
+        </p:txBody>
+      </p:sp>
+    </p:spTree>
+    <p:extLst>
+      <p:ext uri="{BB962C8B-B14F-4D97-AF65-F5344CB8AC3E}">
+        <p14:creationId xmlns:p14="http://schemas.microsoft.com/office/powerpoint/2010/main" val="3643687121"/>
+      </p:ext>
+    </p:extLst>
+  </p:cSld>
+  <p:clrMapOvr>
+    <a:masterClrMapping/>
+  </p:clrMapOvr>
+</p:sldLayout>
+</file>
+
+<file path=ppt/slideLayouts/slideLayout18.xml><?xml version="1.0" encoding="utf-8"?>
+<p:sldLayout xmlns:a="http://schemas.openxmlformats.org/drawingml/2006/main" xmlns:r="http://schemas.openxmlformats.org/officeDocument/2006/relationships" xmlns:p="http://schemas.openxmlformats.org/presentationml/2006/main" type="secHead" preserve="1">
+  <p:cSld name="Section Header">
+    <p:spTree>
+      <p:nvGrpSpPr>
+        <p:cNvPr id="1" name=""/>
+        <p:cNvGrpSpPr/>
+        <p:nvPr/>
+      </p:nvGrpSpPr>
+      <p:grpSpPr>
+        <a:xfrm>
+          <a:off x="0" y="0"/>
+          <a:ext cx="0" cy="0"/>
+          <a:chOff x="0" y="0"/>
+          <a:chExt cx="0" cy="0"/>
+        </a:xfrm>
+      </p:grpSpPr>
+      <p:sp>
+        <p:nvSpPr>
+          <p:cNvPr id="2" name="Title 1">
+            <a:extLst>
+              <a:ext uri="{FF2B5EF4-FFF2-40B4-BE49-F238E27FC236}">
+                <a16:creationId xmlns:a16="http://schemas.microsoft.com/office/drawing/2014/main" id="{EDD30204-737C-CD45-91D1-78D5556368FB}"/>
+              </a:ext>
+            </a:extLst>
+          </p:cNvPr>
+          <p:cNvSpPr>
+            <a:spLocks noGrp="1"/>
+          </p:cNvSpPr>
+          <p:nvPr>
+            <p:ph type="title"/>
+          </p:nvPr>
+        </p:nvSpPr>
+        <p:spPr>
+          <a:xfrm>
+            <a:off x="831850" y="1709738"/>
+            <a:ext cx="10515600" cy="2852737"/>
+          </a:xfrm>
+        </p:spPr>
+        <p:txBody>
+          <a:bodyPr anchor="b"/>
+          <a:lstStyle>
+            <a:lvl1pPr>
+              <a:defRPr sz="6000"/>
+            </a:lvl1pPr>
+          </a:lstStyle>
+          <a:p>
+            <a:r>
+              <a:rPr lang="en-US"/>
+              <a:t>Click to edit Master title style</a:t>
+            </a:r>
+          </a:p>
+        </p:txBody>
+      </p:sp>
+      <p:sp>
+        <p:nvSpPr>
+          <p:cNvPr id="3" name="Text Placeholder 2">
+            <a:extLst>
+              <a:ext uri="{FF2B5EF4-FFF2-40B4-BE49-F238E27FC236}">
+                <a16:creationId xmlns:a16="http://schemas.microsoft.com/office/drawing/2014/main" id="{300CB9BC-3236-694B-8B73-53DFF368BAEE}"/>
+              </a:ext>
+            </a:extLst>
+          </p:cNvPr>
+          <p:cNvSpPr>
+            <a:spLocks noGrp="1"/>
+          </p:cNvSpPr>
+          <p:nvPr>
+            <p:ph type="body" idx="1"/>
+          </p:nvPr>
+        </p:nvSpPr>
+        <p:spPr>
+          <a:xfrm>
+            <a:off x="831850" y="4589463"/>
+            <a:ext cx="10515600" cy="1500187"/>
+          </a:xfrm>
+        </p:spPr>
+        <p:txBody>
+          <a:bodyPr/>
+          <a:lstStyle>
+            <a:lvl1pPr marL="0" indent="0">
+              <a:buNone/>
+              <a:defRPr sz="2400">
+                <a:solidFill>
+                  <a:schemeClr val="tx1">
+                    <a:tint val="75000"/>
+                  </a:schemeClr>
+                </a:solidFill>
+              </a:defRPr>
+            </a:lvl1pPr>
+            <a:lvl2pPr marL="457200" indent="0">
+              <a:buNone/>
+              <a:defRPr sz="2000">
+                <a:solidFill>
+                  <a:schemeClr val="tx1">
+                    <a:tint val="75000"/>
+                  </a:schemeClr>
+                </a:solidFill>
+              </a:defRPr>
+            </a:lvl2pPr>
+            <a:lvl3pPr marL="914400" indent="0">
+              <a:buNone/>
+              <a:defRPr sz="1800">
+                <a:solidFill>
+                  <a:schemeClr val="tx1">
+                    <a:tint val="75000"/>
+                  </a:schemeClr>
+                </a:solidFill>
+              </a:defRPr>
+            </a:lvl3pPr>
+            <a:lvl4pPr marL="1371600" indent="0">
+              <a:buNone/>
+              <a:defRPr sz="1600">
+                <a:solidFill>
+                  <a:schemeClr val="tx1">
+                    <a:tint val="75000"/>
+                  </a:schemeClr>
+                </a:solidFill>
+              </a:defRPr>
+            </a:lvl4pPr>
+            <a:lvl5pPr marL="1828800" indent="0">
+              <a:buNone/>
+              <a:defRPr sz="1600">
+                <a:solidFill>
+                  <a:schemeClr val="tx1">
+                    <a:tint val="75000"/>
+                  </a:schemeClr>
+                </a:solidFill>
+              </a:defRPr>
+            </a:lvl5pPr>
+            <a:lvl6pPr marL="2286000" indent="0">
+              <a:buNone/>
+              <a:defRPr sz="1600">
+                <a:solidFill>
+                  <a:schemeClr val="tx1">
+                    <a:tint val="75000"/>
+                  </a:schemeClr>
+                </a:solidFill>
+              </a:defRPr>
+            </a:lvl6pPr>
+            <a:lvl7pPr marL="2743200" indent="0">
+              <a:buNone/>
+              <a:defRPr sz="1600">
+                <a:solidFill>
+                  <a:schemeClr val="tx1">
+                    <a:tint val="75000"/>
+                  </a:schemeClr>
+                </a:solidFill>
+              </a:defRPr>
+            </a:lvl7pPr>
+            <a:lvl8pPr marL="3200400" indent="0">
+              <a:buNone/>
+              <a:defRPr sz="1600">
+                <a:solidFill>
+                  <a:schemeClr val="tx1">
+                    <a:tint val="75000"/>
+                  </a:schemeClr>
+                </a:solidFill>
+              </a:defRPr>
+            </a:lvl8pPr>
+            <a:lvl9pPr marL="3657600" indent="0">
+              <a:buNone/>
+              <a:defRPr sz="1600">
+                <a:solidFill>
+                  <a:schemeClr val="tx1">
+                    <a:tint val="75000"/>
+                  </a:schemeClr>
+                </a:solidFill>
+              </a:defRPr>
+            </a:lvl9pPr>
+          </a:lstStyle>
+          <a:p>
+            <a:pPr lvl="0"/>
+            <a:r>
+              <a:rPr lang="en-US"/>
+              <a:t>Click to edit Master text styles</a:t>
+            </a:r>
+          </a:p>
+        </p:txBody>
+      </p:sp>
+      <p:sp>
+        <p:nvSpPr>
+          <p:cNvPr id="4" name="Date Placeholder 3">
+            <a:extLst>
+              <a:ext uri="{FF2B5EF4-FFF2-40B4-BE49-F238E27FC236}">
+                <a16:creationId xmlns:a16="http://schemas.microsoft.com/office/drawing/2014/main" id="{E46FB1DA-5604-B74D-99C0-08023930D51B}"/>
+              </a:ext>
+            </a:extLst>
+          </p:cNvPr>
+          <p:cNvSpPr>
+            <a:spLocks noGrp="1"/>
+          </p:cNvSpPr>
+          <p:nvPr>
+            <p:ph type="dt" sz="half" idx="10"/>
+          </p:nvPr>
+        </p:nvSpPr>
+        <p:spPr/>
+        <p:txBody>
+          <a:bodyPr/>
+          <a:lstStyle/>
+          <a:p>
+            <a:fld id="{53FA46FA-1708-D043-B900-E932D5DF811C}" type="datetimeFigureOut">
+              <a:rPr lang="en-US" smtClean="0"/>
+              <a:t>7/18/19</a:t>
+            </a:fld>
+            <a:endParaRPr lang="en-US"/>
+          </a:p>
+        </p:txBody>
+      </p:sp>
+      <p:sp>
+        <p:nvSpPr>
+          <p:cNvPr id="5" name="Footer Placeholder 4">
+            <a:extLst>
+              <a:ext uri="{FF2B5EF4-FFF2-40B4-BE49-F238E27FC236}">
+                <a16:creationId xmlns:a16="http://schemas.microsoft.com/office/drawing/2014/main" id="{8444DEFB-D0EA-E646-802D-3E2B376D50EC}"/>
+              </a:ext>
+            </a:extLst>
+          </p:cNvPr>
+          <p:cNvSpPr>
+            <a:spLocks noGrp="1"/>
+          </p:cNvSpPr>
+          <p:nvPr>
+            <p:ph type="ftr" sz="quarter" idx="11"/>
+          </p:nvPr>
+        </p:nvSpPr>
+        <p:spPr/>
+        <p:txBody>
+          <a:bodyPr/>
+          <a:lstStyle/>
+          <a:p>
+            <a:endParaRPr lang="en-US"/>
+          </a:p>
+        </p:txBody>
+      </p:sp>
+      <p:sp>
+        <p:nvSpPr>
+          <p:cNvPr id="6" name="Slide Number Placeholder 5">
+            <a:extLst>
+              <a:ext uri="{FF2B5EF4-FFF2-40B4-BE49-F238E27FC236}">
+                <a16:creationId xmlns:a16="http://schemas.microsoft.com/office/drawing/2014/main" id="{AFD3CB0A-BF1D-804A-9E3A-D8880E3A06A0}"/>
+              </a:ext>
+            </a:extLst>
+          </p:cNvPr>
+          <p:cNvSpPr>
+            <a:spLocks noGrp="1"/>
+          </p:cNvSpPr>
+          <p:nvPr>
+            <p:ph type="sldNum" sz="quarter" idx="12"/>
+          </p:nvPr>
+        </p:nvSpPr>
+        <p:spPr/>
+        <p:txBody>
+          <a:bodyPr/>
+          <a:lstStyle/>
+          <a:p>
+            <a:fld id="{86CB4B4D-7CA3-9044-876B-883B54F8677D}" type="slidenum">
+              <a:rPr lang="en-US" smtClean="0"/>
+              <a:t>‹#›</a:t>
+            </a:fld>
+            <a:endParaRPr lang="en-US"/>
+          </a:p>
+        </p:txBody>
+      </p:sp>
+    </p:spTree>
+    <p:extLst>
+      <p:ext uri="{BB962C8B-B14F-4D97-AF65-F5344CB8AC3E}">
+        <p14:creationId xmlns:p14="http://schemas.microsoft.com/office/powerpoint/2010/main" val="2161949525"/>
+      </p:ext>
+    </p:extLst>
+  </p:cSld>
+  <p:clrMapOvr>
+    <a:masterClrMapping/>
+  </p:clrMapOvr>
+</p:sldLayout>
+</file>
+
+<file path=ppt/slideLayouts/slideLayout19.xml><?xml version="1.0" encoding="utf-8"?>
+<p:sldLayout xmlns:a="http://schemas.openxmlformats.org/drawingml/2006/main" xmlns:r="http://schemas.openxmlformats.org/officeDocument/2006/relationships" xmlns:p="http://schemas.openxmlformats.org/presentationml/2006/main" type="twoObj" preserve="1">
+  <p:cSld name="Two Content">
+    <p:spTree>
+      <p:nvGrpSpPr>
+        <p:cNvPr id="1" name=""/>
+        <p:cNvGrpSpPr/>
+        <p:nvPr/>
+      </p:nvGrpSpPr>
+      <p:grpSpPr>
+        <a:xfrm>
+          <a:off x="0" y="0"/>
+          <a:ext cx="0" cy="0"/>
+          <a:chOff x="0" y="0"/>
+          <a:chExt cx="0" cy="0"/>
+        </a:xfrm>
+      </p:grpSpPr>
+      <p:sp>
+        <p:nvSpPr>
+          <p:cNvPr id="2" name="Title 1">
+            <a:extLst>
+              <a:ext uri="{FF2B5EF4-FFF2-40B4-BE49-F238E27FC236}">
+                <a16:creationId xmlns:a16="http://schemas.microsoft.com/office/drawing/2014/main" id="{67A2D3C4-3081-E842-B809-32508B68A92D}"/>
+              </a:ext>
+            </a:extLst>
+          </p:cNvPr>
+          <p:cNvSpPr>
+            <a:spLocks noGrp="1"/>
+          </p:cNvSpPr>
+          <p:nvPr>
+            <p:ph type="title"/>
+          </p:nvPr>
+        </p:nvSpPr>
+        <p:spPr/>
+        <p:txBody>
+          <a:bodyPr/>
+          <a:lstStyle/>
+          <a:p>
+            <a:r>
+              <a:rPr lang="en-US"/>
+              <a:t>Click to edit Master title style</a:t>
+            </a:r>
+          </a:p>
+        </p:txBody>
+      </p:sp>
+      <p:sp>
+        <p:nvSpPr>
+          <p:cNvPr id="3" name="Content Placeholder 2">
+            <a:extLst>
+              <a:ext uri="{FF2B5EF4-FFF2-40B4-BE49-F238E27FC236}">
+                <a16:creationId xmlns:a16="http://schemas.microsoft.com/office/drawing/2014/main" id="{10EA5FF8-5437-8240-80C2-3B5C42734C3A}"/>
+              </a:ext>
+            </a:extLst>
+          </p:cNvPr>
+          <p:cNvSpPr>
+            <a:spLocks noGrp="1"/>
+          </p:cNvSpPr>
+          <p:nvPr>
+            <p:ph sz="half" idx="1"/>
+          </p:nvPr>
+        </p:nvSpPr>
+        <p:spPr>
+          <a:xfrm>
+            <a:off x="838200" y="1825625"/>
+            <a:ext cx="5181600" cy="4351338"/>
+          </a:xfrm>
+        </p:spPr>
+        <p:txBody>
+          <a:bodyPr/>
+          <a:lstStyle/>
+          <a:p>
+            <a:pPr lvl="0"/>
+            <a:r>
+              <a:rPr lang="en-US"/>
+              <a:t>Click to edit Master text styles</a:t>
+            </a:r>
+          </a:p>
+          <a:p>
+            <a:pPr lvl="1"/>
+            <a:r>
+              <a:rPr lang="en-US"/>
+              <a:t>Second level</a:t>
+            </a:r>
+          </a:p>
+          <a:p>
+            <a:pPr lvl="2"/>
+            <a:r>
+              <a:rPr lang="en-US"/>
+              <a:t>Third level</a:t>
+            </a:r>
+          </a:p>
+          <a:p>
+            <a:pPr lvl="3"/>
+            <a:r>
+              <a:rPr lang="en-US"/>
+              <a:t>Fourth level</a:t>
+            </a:r>
+          </a:p>
+          <a:p>
+            <a:pPr lvl="4"/>
+            <a:r>
+              <a:rPr lang="en-US"/>
+              <a:t>Fifth level</a:t>
+            </a:r>
+          </a:p>
+        </p:txBody>
+      </p:sp>
+      <p:sp>
+        <p:nvSpPr>
+          <p:cNvPr id="4" name="Content Placeholder 3">
+            <a:extLst>
+              <a:ext uri="{FF2B5EF4-FFF2-40B4-BE49-F238E27FC236}">
+                <a16:creationId xmlns:a16="http://schemas.microsoft.com/office/drawing/2014/main" id="{7AAE1E64-2CFD-D54C-8AA0-1E8061E90706}"/>
+              </a:ext>
+            </a:extLst>
+          </p:cNvPr>
+          <p:cNvSpPr>
+            <a:spLocks noGrp="1"/>
+          </p:cNvSpPr>
+          <p:nvPr>
+            <p:ph sz="half" idx="2"/>
+          </p:nvPr>
+        </p:nvSpPr>
+        <p:spPr>
+          <a:xfrm>
+            <a:off x="6172200" y="1825625"/>
+            <a:ext cx="5181600" cy="4351338"/>
+          </a:xfrm>
+        </p:spPr>
+        <p:txBody>
+          <a:bodyPr/>
+          <a:lstStyle/>
+          <a:p>
+            <a:pPr lvl="0"/>
+            <a:r>
+              <a:rPr lang="en-US"/>
+              <a:t>Click to edit Master text styles</a:t>
+            </a:r>
+          </a:p>
+          <a:p>
+            <a:pPr lvl="1"/>
+            <a:r>
+              <a:rPr lang="en-US"/>
+              <a:t>Second level</a:t>
+            </a:r>
+          </a:p>
+          <a:p>
+            <a:pPr lvl="2"/>
+            <a:r>
+              <a:rPr lang="en-US"/>
+              <a:t>Third level</a:t>
+            </a:r>
+          </a:p>
+          <a:p>
+            <a:pPr lvl="3"/>
+            <a:r>
+              <a:rPr lang="en-US"/>
+              <a:t>Fourth level</a:t>
+            </a:r>
+          </a:p>
+          <a:p>
+            <a:pPr lvl="4"/>
+            <a:r>
+              <a:rPr lang="en-US"/>
+              <a:t>Fifth level</a:t>
+            </a:r>
+          </a:p>
+        </p:txBody>
+      </p:sp>
+      <p:sp>
+        <p:nvSpPr>
+          <p:cNvPr id="5" name="Date Placeholder 4">
+            <a:extLst>
+              <a:ext uri="{FF2B5EF4-FFF2-40B4-BE49-F238E27FC236}">
+                <a16:creationId xmlns:a16="http://schemas.microsoft.com/office/drawing/2014/main" id="{00D50023-CB70-A646-B291-095BBF75DD13}"/>
+              </a:ext>
+            </a:extLst>
+          </p:cNvPr>
+          <p:cNvSpPr>
+            <a:spLocks noGrp="1"/>
+          </p:cNvSpPr>
+          <p:nvPr>
+            <p:ph type="dt" sz="half" idx="10"/>
+          </p:nvPr>
+        </p:nvSpPr>
+        <p:spPr/>
+        <p:txBody>
+          <a:bodyPr/>
+          <a:lstStyle/>
+          <a:p>
+            <a:fld id="{53FA46FA-1708-D043-B900-E932D5DF811C}" type="datetimeFigureOut">
+              <a:rPr lang="en-US" smtClean="0"/>
+              <a:t>7/18/19</a:t>
+            </a:fld>
+            <a:endParaRPr lang="en-US"/>
+          </a:p>
+        </p:txBody>
+      </p:sp>
+      <p:sp>
+        <p:nvSpPr>
+          <p:cNvPr id="6" name="Footer Placeholder 5">
+            <a:extLst>
+              <a:ext uri="{FF2B5EF4-FFF2-40B4-BE49-F238E27FC236}">
+                <a16:creationId xmlns:a16="http://schemas.microsoft.com/office/drawing/2014/main" id="{FE08706B-91D4-0149-A91E-7CBA859FEF01}"/>
+              </a:ext>
+            </a:extLst>
+          </p:cNvPr>
+          <p:cNvSpPr>
+            <a:spLocks noGrp="1"/>
+          </p:cNvSpPr>
+          <p:nvPr>
+            <p:ph type="ftr" sz="quarter" idx="11"/>
+          </p:nvPr>
+        </p:nvSpPr>
+        <p:spPr/>
+        <p:txBody>
+          <a:bodyPr/>
+          <a:lstStyle/>
+          <a:p>
+            <a:endParaRPr lang="en-US"/>
+          </a:p>
+        </p:txBody>
+      </p:sp>
+      <p:sp>
+        <p:nvSpPr>
+          <p:cNvPr id="7" name="Slide Number Placeholder 6">
+            <a:extLst>
+              <a:ext uri="{FF2B5EF4-FFF2-40B4-BE49-F238E27FC236}">
+                <a16:creationId xmlns:a16="http://schemas.microsoft.com/office/drawing/2014/main" id="{74487935-CAD3-E944-9595-BAB4BC92915A}"/>
+              </a:ext>
+            </a:extLst>
+          </p:cNvPr>
+          <p:cNvSpPr>
+            <a:spLocks noGrp="1"/>
+          </p:cNvSpPr>
+          <p:nvPr>
+            <p:ph type="sldNum" sz="quarter" idx="12"/>
+          </p:nvPr>
+        </p:nvSpPr>
+        <p:spPr/>
+        <p:txBody>
+          <a:bodyPr/>
+          <a:lstStyle/>
+          <a:p>
+            <a:fld id="{86CB4B4D-7CA3-9044-876B-883B54F8677D}" type="slidenum">
+              <a:rPr lang="en-US" smtClean="0"/>
+              <a:t>‹#›</a:t>
+            </a:fld>
+            <a:endParaRPr lang="en-US"/>
+          </a:p>
+        </p:txBody>
+      </p:sp>
+    </p:spTree>
+    <p:extLst>
+      <p:ext uri="{BB962C8B-B14F-4D97-AF65-F5344CB8AC3E}">
+        <p14:creationId xmlns:p14="http://schemas.microsoft.com/office/powerpoint/2010/main" val="417736727"/>
+      </p:ext>
+    </p:extLst>
+  </p:cSld>
+  <p:clrMapOvr>
+    <a:masterClrMapping/>
+  </p:clrMapOvr>
+</p:sldLayout>
+</file>
+
 <file path=ppt/slideLayouts/slideLayout2.xml><?xml version="1.0" encoding="utf-8"?>
 <p:sldLayout xmlns:a="http://schemas.openxmlformats.org/drawingml/2006/main" xmlns:r="http://schemas.openxmlformats.org/officeDocument/2006/relationships" xmlns:p="http://schemas.openxmlformats.org/presentationml/2006/main" type="title" preserve="1">
   <p:cSld name="Title - Center Blue">
@@ -1938,6 +2898,1734 @@
     <p:extLst>
       <p:ext uri="{BB962C8B-B14F-4D97-AF65-F5344CB8AC3E}">
         <p14:creationId xmlns:p14="http://schemas.microsoft.com/office/powerpoint/2010/main" val="1140428824"/>
+      </p:ext>
+    </p:extLst>
+  </p:cSld>
+  <p:clrMapOvr>
+    <a:masterClrMapping/>
+  </p:clrMapOvr>
+  <p:transition spd="med"/>
+</p:sldLayout>
+</file>
+
+<file path=ppt/slideLayouts/slideLayout20.xml><?xml version="1.0" encoding="utf-8"?>
+<p:sldLayout xmlns:a="http://schemas.openxmlformats.org/drawingml/2006/main" xmlns:r="http://schemas.openxmlformats.org/officeDocument/2006/relationships" xmlns:p="http://schemas.openxmlformats.org/presentationml/2006/main" type="twoTxTwoObj" preserve="1">
+  <p:cSld name="Comparison">
+    <p:spTree>
+      <p:nvGrpSpPr>
+        <p:cNvPr id="1" name=""/>
+        <p:cNvGrpSpPr/>
+        <p:nvPr/>
+      </p:nvGrpSpPr>
+      <p:grpSpPr>
+        <a:xfrm>
+          <a:off x="0" y="0"/>
+          <a:ext cx="0" cy="0"/>
+          <a:chOff x="0" y="0"/>
+          <a:chExt cx="0" cy="0"/>
+        </a:xfrm>
+      </p:grpSpPr>
+      <p:sp>
+        <p:nvSpPr>
+          <p:cNvPr id="2" name="Title 1">
+            <a:extLst>
+              <a:ext uri="{FF2B5EF4-FFF2-40B4-BE49-F238E27FC236}">
+                <a16:creationId xmlns:a16="http://schemas.microsoft.com/office/drawing/2014/main" id="{D0379600-11C6-5E4E-888B-5302B26FFD7B}"/>
+              </a:ext>
+            </a:extLst>
+          </p:cNvPr>
+          <p:cNvSpPr>
+            <a:spLocks noGrp="1"/>
+          </p:cNvSpPr>
+          <p:nvPr>
+            <p:ph type="title"/>
+          </p:nvPr>
+        </p:nvSpPr>
+        <p:spPr>
+          <a:xfrm>
+            <a:off x="839788" y="365125"/>
+            <a:ext cx="10515600" cy="1325563"/>
+          </a:xfrm>
+        </p:spPr>
+        <p:txBody>
+          <a:bodyPr/>
+          <a:lstStyle/>
+          <a:p>
+            <a:r>
+              <a:rPr lang="en-US"/>
+              <a:t>Click to edit Master title style</a:t>
+            </a:r>
+          </a:p>
+        </p:txBody>
+      </p:sp>
+      <p:sp>
+        <p:nvSpPr>
+          <p:cNvPr id="3" name="Text Placeholder 2">
+            <a:extLst>
+              <a:ext uri="{FF2B5EF4-FFF2-40B4-BE49-F238E27FC236}">
+                <a16:creationId xmlns:a16="http://schemas.microsoft.com/office/drawing/2014/main" id="{F6FFBB5D-0087-F546-82F4-AD02B803153A}"/>
+              </a:ext>
+            </a:extLst>
+          </p:cNvPr>
+          <p:cNvSpPr>
+            <a:spLocks noGrp="1"/>
+          </p:cNvSpPr>
+          <p:nvPr>
+            <p:ph type="body" idx="1"/>
+          </p:nvPr>
+        </p:nvSpPr>
+        <p:spPr>
+          <a:xfrm>
+            <a:off x="839788" y="1681163"/>
+            <a:ext cx="5157787" cy="823912"/>
+          </a:xfrm>
+        </p:spPr>
+        <p:txBody>
+          <a:bodyPr anchor="b"/>
+          <a:lstStyle>
+            <a:lvl1pPr marL="0" indent="0">
+              <a:buNone/>
+              <a:defRPr sz="2400" b="1"/>
+            </a:lvl1pPr>
+            <a:lvl2pPr marL="457200" indent="0">
+              <a:buNone/>
+              <a:defRPr sz="2000" b="1"/>
+            </a:lvl2pPr>
+            <a:lvl3pPr marL="914400" indent="0">
+              <a:buNone/>
+              <a:defRPr sz="1800" b="1"/>
+            </a:lvl3pPr>
+            <a:lvl4pPr marL="1371600" indent="0">
+              <a:buNone/>
+              <a:defRPr sz="1600" b="1"/>
+            </a:lvl4pPr>
+            <a:lvl5pPr marL="1828800" indent="0">
+              <a:buNone/>
+              <a:defRPr sz="1600" b="1"/>
+            </a:lvl5pPr>
+            <a:lvl6pPr marL="2286000" indent="0">
+              <a:buNone/>
+              <a:defRPr sz="1600" b="1"/>
+            </a:lvl6pPr>
+            <a:lvl7pPr marL="2743200" indent="0">
+              <a:buNone/>
+              <a:defRPr sz="1600" b="1"/>
+            </a:lvl7pPr>
+            <a:lvl8pPr marL="3200400" indent="0">
+              <a:buNone/>
+              <a:defRPr sz="1600" b="1"/>
+            </a:lvl8pPr>
+            <a:lvl9pPr marL="3657600" indent="0">
+              <a:buNone/>
+              <a:defRPr sz="1600" b="1"/>
+            </a:lvl9pPr>
+          </a:lstStyle>
+          <a:p>
+            <a:pPr lvl="0"/>
+            <a:r>
+              <a:rPr lang="en-US"/>
+              <a:t>Click to edit Master text styles</a:t>
+            </a:r>
+          </a:p>
+        </p:txBody>
+      </p:sp>
+      <p:sp>
+        <p:nvSpPr>
+          <p:cNvPr id="4" name="Content Placeholder 3">
+            <a:extLst>
+              <a:ext uri="{FF2B5EF4-FFF2-40B4-BE49-F238E27FC236}">
+                <a16:creationId xmlns:a16="http://schemas.microsoft.com/office/drawing/2014/main" id="{944F67B3-7C41-F24F-8A42-D9C25195617D}"/>
+              </a:ext>
+            </a:extLst>
+          </p:cNvPr>
+          <p:cNvSpPr>
+            <a:spLocks noGrp="1"/>
+          </p:cNvSpPr>
+          <p:nvPr>
+            <p:ph sz="half" idx="2"/>
+          </p:nvPr>
+        </p:nvSpPr>
+        <p:spPr>
+          <a:xfrm>
+            <a:off x="839788" y="2505075"/>
+            <a:ext cx="5157787" cy="3684588"/>
+          </a:xfrm>
+        </p:spPr>
+        <p:txBody>
+          <a:bodyPr/>
+          <a:lstStyle/>
+          <a:p>
+            <a:pPr lvl="0"/>
+            <a:r>
+              <a:rPr lang="en-US"/>
+              <a:t>Click to edit Master text styles</a:t>
+            </a:r>
+          </a:p>
+          <a:p>
+            <a:pPr lvl="1"/>
+            <a:r>
+              <a:rPr lang="en-US"/>
+              <a:t>Second level</a:t>
+            </a:r>
+          </a:p>
+          <a:p>
+            <a:pPr lvl="2"/>
+            <a:r>
+              <a:rPr lang="en-US"/>
+              <a:t>Third level</a:t>
+            </a:r>
+          </a:p>
+          <a:p>
+            <a:pPr lvl="3"/>
+            <a:r>
+              <a:rPr lang="en-US"/>
+              <a:t>Fourth level</a:t>
+            </a:r>
+          </a:p>
+          <a:p>
+            <a:pPr lvl="4"/>
+            <a:r>
+              <a:rPr lang="en-US"/>
+              <a:t>Fifth level</a:t>
+            </a:r>
+          </a:p>
+        </p:txBody>
+      </p:sp>
+      <p:sp>
+        <p:nvSpPr>
+          <p:cNvPr id="5" name="Text Placeholder 4">
+            <a:extLst>
+              <a:ext uri="{FF2B5EF4-FFF2-40B4-BE49-F238E27FC236}">
+                <a16:creationId xmlns:a16="http://schemas.microsoft.com/office/drawing/2014/main" id="{581189B8-5574-7C49-B816-E2A36D992839}"/>
+              </a:ext>
+            </a:extLst>
+          </p:cNvPr>
+          <p:cNvSpPr>
+            <a:spLocks noGrp="1"/>
+          </p:cNvSpPr>
+          <p:nvPr>
+            <p:ph type="body" sz="quarter" idx="3"/>
+          </p:nvPr>
+        </p:nvSpPr>
+        <p:spPr>
+          <a:xfrm>
+            <a:off x="6172200" y="1681163"/>
+            <a:ext cx="5183188" cy="823912"/>
+          </a:xfrm>
+        </p:spPr>
+        <p:txBody>
+          <a:bodyPr anchor="b"/>
+          <a:lstStyle>
+            <a:lvl1pPr marL="0" indent="0">
+              <a:buNone/>
+              <a:defRPr sz="2400" b="1"/>
+            </a:lvl1pPr>
+            <a:lvl2pPr marL="457200" indent="0">
+              <a:buNone/>
+              <a:defRPr sz="2000" b="1"/>
+            </a:lvl2pPr>
+            <a:lvl3pPr marL="914400" indent="0">
+              <a:buNone/>
+              <a:defRPr sz="1800" b="1"/>
+            </a:lvl3pPr>
+            <a:lvl4pPr marL="1371600" indent="0">
+              <a:buNone/>
+              <a:defRPr sz="1600" b="1"/>
+            </a:lvl4pPr>
+            <a:lvl5pPr marL="1828800" indent="0">
+              <a:buNone/>
+              <a:defRPr sz="1600" b="1"/>
+            </a:lvl5pPr>
+            <a:lvl6pPr marL="2286000" indent="0">
+              <a:buNone/>
+              <a:defRPr sz="1600" b="1"/>
+            </a:lvl6pPr>
+            <a:lvl7pPr marL="2743200" indent="0">
+              <a:buNone/>
+              <a:defRPr sz="1600" b="1"/>
+            </a:lvl7pPr>
+            <a:lvl8pPr marL="3200400" indent="0">
+              <a:buNone/>
+              <a:defRPr sz="1600" b="1"/>
+            </a:lvl8pPr>
+            <a:lvl9pPr marL="3657600" indent="0">
+              <a:buNone/>
+              <a:defRPr sz="1600" b="1"/>
+            </a:lvl9pPr>
+          </a:lstStyle>
+          <a:p>
+            <a:pPr lvl="0"/>
+            <a:r>
+              <a:rPr lang="en-US"/>
+              <a:t>Click to edit Master text styles</a:t>
+            </a:r>
+          </a:p>
+        </p:txBody>
+      </p:sp>
+      <p:sp>
+        <p:nvSpPr>
+          <p:cNvPr id="6" name="Content Placeholder 5">
+            <a:extLst>
+              <a:ext uri="{FF2B5EF4-FFF2-40B4-BE49-F238E27FC236}">
+                <a16:creationId xmlns:a16="http://schemas.microsoft.com/office/drawing/2014/main" id="{3A62507C-1D09-F94D-96DE-1B2EAB770282}"/>
+              </a:ext>
+            </a:extLst>
+          </p:cNvPr>
+          <p:cNvSpPr>
+            <a:spLocks noGrp="1"/>
+          </p:cNvSpPr>
+          <p:nvPr>
+            <p:ph sz="quarter" idx="4"/>
+          </p:nvPr>
+        </p:nvSpPr>
+        <p:spPr>
+          <a:xfrm>
+            <a:off x="6172200" y="2505075"/>
+            <a:ext cx="5183188" cy="3684588"/>
+          </a:xfrm>
+        </p:spPr>
+        <p:txBody>
+          <a:bodyPr/>
+          <a:lstStyle/>
+          <a:p>
+            <a:pPr lvl="0"/>
+            <a:r>
+              <a:rPr lang="en-US"/>
+              <a:t>Click to edit Master text styles</a:t>
+            </a:r>
+          </a:p>
+          <a:p>
+            <a:pPr lvl="1"/>
+            <a:r>
+              <a:rPr lang="en-US"/>
+              <a:t>Second level</a:t>
+            </a:r>
+          </a:p>
+          <a:p>
+            <a:pPr lvl="2"/>
+            <a:r>
+              <a:rPr lang="en-US"/>
+              <a:t>Third level</a:t>
+            </a:r>
+          </a:p>
+          <a:p>
+            <a:pPr lvl="3"/>
+            <a:r>
+              <a:rPr lang="en-US"/>
+              <a:t>Fourth level</a:t>
+            </a:r>
+          </a:p>
+          <a:p>
+            <a:pPr lvl="4"/>
+            <a:r>
+              <a:rPr lang="en-US"/>
+              <a:t>Fifth level</a:t>
+            </a:r>
+          </a:p>
+        </p:txBody>
+      </p:sp>
+      <p:sp>
+        <p:nvSpPr>
+          <p:cNvPr id="7" name="Date Placeholder 6">
+            <a:extLst>
+              <a:ext uri="{FF2B5EF4-FFF2-40B4-BE49-F238E27FC236}">
+                <a16:creationId xmlns:a16="http://schemas.microsoft.com/office/drawing/2014/main" id="{9FBD575B-FC02-954B-B1AF-B44D3FEE69A6}"/>
+              </a:ext>
+            </a:extLst>
+          </p:cNvPr>
+          <p:cNvSpPr>
+            <a:spLocks noGrp="1"/>
+          </p:cNvSpPr>
+          <p:nvPr>
+            <p:ph type="dt" sz="half" idx="10"/>
+          </p:nvPr>
+        </p:nvSpPr>
+        <p:spPr/>
+        <p:txBody>
+          <a:bodyPr/>
+          <a:lstStyle/>
+          <a:p>
+            <a:fld id="{53FA46FA-1708-D043-B900-E932D5DF811C}" type="datetimeFigureOut">
+              <a:rPr lang="en-US" smtClean="0"/>
+              <a:t>7/18/19</a:t>
+            </a:fld>
+            <a:endParaRPr lang="en-US"/>
+          </a:p>
+        </p:txBody>
+      </p:sp>
+      <p:sp>
+        <p:nvSpPr>
+          <p:cNvPr id="8" name="Footer Placeholder 7">
+            <a:extLst>
+              <a:ext uri="{FF2B5EF4-FFF2-40B4-BE49-F238E27FC236}">
+                <a16:creationId xmlns:a16="http://schemas.microsoft.com/office/drawing/2014/main" id="{B8F06779-9901-7F4B-B8C7-920381C99090}"/>
+              </a:ext>
+            </a:extLst>
+          </p:cNvPr>
+          <p:cNvSpPr>
+            <a:spLocks noGrp="1"/>
+          </p:cNvSpPr>
+          <p:nvPr>
+            <p:ph type="ftr" sz="quarter" idx="11"/>
+          </p:nvPr>
+        </p:nvSpPr>
+        <p:spPr/>
+        <p:txBody>
+          <a:bodyPr/>
+          <a:lstStyle/>
+          <a:p>
+            <a:endParaRPr lang="en-US"/>
+          </a:p>
+        </p:txBody>
+      </p:sp>
+      <p:sp>
+        <p:nvSpPr>
+          <p:cNvPr id="9" name="Slide Number Placeholder 8">
+            <a:extLst>
+              <a:ext uri="{FF2B5EF4-FFF2-40B4-BE49-F238E27FC236}">
+                <a16:creationId xmlns:a16="http://schemas.microsoft.com/office/drawing/2014/main" id="{E6B323D8-ABD7-CC40-9103-22E79061CB74}"/>
+              </a:ext>
+            </a:extLst>
+          </p:cNvPr>
+          <p:cNvSpPr>
+            <a:spLocks noGrp="1"/>
+          </p:cNvSpPr>
+          <p:nvPr>
+            <p:ph type="sldNum" sz="quarter" idx="12"/>
+          </p:nvPr>
+        </p:nvSpPr>
+        <p:spPr/>
+        <p:txBody>
+          <a:bodyPr/>
+          <a:lstStyle/>
+          <a:p>
+            <a:fld id="{86CB4B4D-7CA3-9044-876B-883B54F8677D}" type="slidenum">
+              <a:rPr lang="en-US" smtClean="0"/>
+              <a:t>‹#›</a:t>
+            </a:fld>
+            <a:endParaRPr lang="en-US"/>
+          </a:p>
+        </p:txBody>
+      </p:sp>
+    </p:spTree>
+    <p:extLst>
+      <p:ext uri="{BB962C8B-B14F-4D97-AF65-F5344CB8AC3E}">
+        <p14:creationId xmlns:p14="http://schemas.microsoft.com/office/powerpoint/2010/main" val="3270157869"/>
+      </p:ext>
+    </p:extLst>
+  </p:cSld>
+  <p:clrMapOvr>
+    <a:masterClrMapping/>
+  </p:clrMapOvr>
+</p:sldLayout>
+</file>
+
+<file path=ppt/slideLayouts/slideLayout21.xml><?xml version="1.0" encoding="utf-8"?>
+<p:sldLayout xmlns:a="http://schemas.openxmlformats.org/drawingml/2006/main" xmlns:r="http://schemas.openxmlformats.org/officeDocument/2006/relationships" xmlns:p="http://schemas.openxmlformats.org/presentationml/2006/main" type="titleOnly" preserve="1">
+  <p:cSld name="Title Only">
+    <p:spTree>
+      <p:nvGrpSpPr>
+        <p:cNvPr id="1" name=""/>
+        <p:cNvGrpSpPr/>
+        <p:nvPr/>
+      </p:nvGrpSpPr>
+      <p:grpSpPr>
+        <a:xfrm>
+          <a:off x="0" y="0"/>
+          <a:ext cx="0" cy="0"/>
+          <a:chOff x="0" y="0"/>
+          <a:chExt cx="0" cy="0"/>
+        </a:xfrm>
+      </p:grpSpPr>
+      <p:sp>
+        <p:nvSpPr>
+          <p:cNvPr id="2" name="Title 1">
+            <a:extLst>
+              <a:ext uri="{FF2B5EF4-FFF2-40B4-BE49-F238E27FC236}">
+                <a16:creationId xmlns:a16="http://schemas.microsoft.com/office/drawing/2014/main" id="{405B155D-5716-3F48-B8F2-8117E99B568C}"/>
+              </a:ext>
+            </a:extLst>
+          </p:cNvPr>
+          <p:cNvSpPr>
+            <a:spLocks noGrp="1"/>
+          </p:cNvSpPr>
+          <p:nvPr>
+            <p:ph type="title"/>
+          </p:nvPr>
+        </p:nvSpPr>
+        <p:spPr/>
+        <p:txBody>
+          <a:bodyPr/>
+          <a:lstStyle/>
+          <a:p>
+            <a:r>
+              <a:rPr lang="en-US"/>
+              <a:t>Click to edit Master title style</a:t>
+            </a:r>
+          </a:p>
+        </p:txBody>
+      </p:sp>
+      <p:sp>
+        <p:nvSpPr>
+          <p:cNvPr id="3" name="Date Placeholder 2">
+            <a:extLst>
+              <a:ext uri="{FF2B5EF4-FFF2-40B4-BE49-F238E27FC236}">
+                <a16:creationId xmlns:a16="http://schemas.microsoft.com/office/drawing/2014/main" id="{4B0AE1CF-D3DC-5A43-B756-7FC13176D3F4}"/>
+              </a:ext>
+            </a:extLst>
+          </p:cNvPr>
+          <p:cNvSpPr>
+            <a:spLocks noGrp="1"/>
+          </p:cNvSpPr>
+          <p:nvPr>
+            <p:ph type="dt" sz="half" idx="10"/>
+          </p:nvPr>
+        </p:nvSpPr>
+        <p:spPr/>
+        <p:txBody>
+          <a:bodyPr/>
+          <a:lstStyle/>
+          <a:p>
+            <a:fld id="{53FA46FA-1708-D043-B900-E932D5DF811C}" type="datetimeFigureOut">
+              <a:rPr lang="en-US" smtClean="0"/>
+              <a:t>7/18/19</a:t>
+            </a:fld>
+            <a:endParaRPr lang="en-US"/>
+          </a:p>
+        </p:txBody>
+      </p:sp>
+      <p:sp>
+        <p:nvSpPr>
+          <p:cNvPr id="4" name="Footer Placeholder 3">
+            <a:extLst>
+              <a:ext uri="{FF2B5EF4-FFF2-40B4-BE49-F238E27FC236}">
+                <a16:creationId xmlns:a16="http://schemas.microsoft.com/office/drawing/2014/main" id="{B1749BF6-5D30-FC40-A64E-01E99C02591C}"/>
+              </a:ext>
+            </a:extLst>
+          </p:cNvPr>
+          <p:cNvSpPr>
+            <a:spLocks noGrp="1"/>
+          </p:cNvSpPr>
+          <p:nvPr>
+            <p:ph type="ftr" sz="quarter" idx="11"/>
+          </p:nvPr>
+        </p:nvSpPr>
+        <p:spPr/>
+        <p:txBody>
+          <a:bodyPr/>
+          <a:lstStyle/>
+          <a:p>
+            <a:endParaRPr lang="en-US"/>
+          </a:p>
+        </p:txBody>
+      </p:sp>
+      <p:sp>
+        <p:nvSpPr>
+          <p:cNvPr id="5" name="Slide Number Placeholder 4">
+            <a:extLst>
+              <a:ext uri="{FF2B5EF4-FFF2-40B4-BE49-F238E27FC236}">
+                <a16:creationId xmlns:a16="http://schemas.microsoft.com/office/drawing/2014/main" id="{E6C85FFE-CBD0-9840-B128-46D70F5C2BD3}"/>
+              </a:ext>
+            </a:extLst>
+          </p:cNvPr>
+          <p:cNvSpPr>
+            <a:spLocks noGrp="1"/>
+          </p:cNvSpPr>
+          <p:nvPr>
+            <p:ph type="sldNum" sz="quarter" idx="12"/>
+          </p:nvPr>
+        </p:nvSpPr>
+        <p:spPr/>
+        <p:txBody>
+          <a:bodyPr/>
+          <a:lstStyle/>
+          <a:p>
+            <a:fld id="{86CB4B4D-7CA3-9044-876B-883B54F8677D}" type="slidenum">
+              <a:rPr lang="en-US" smtClean="0"/>
+              <a:t>‹#›</a:t>
+            </a:fld>
+            <a:endParaRPr lang="en-US"/>
+          </a:p>
+        </p:txBody>
+      </p:sp>
+    </p:spTree>
+    <p:extLst>
+      <p:ext uri="{BB962C8B-B14F-4D97-AF65-F5344CB8AC3E}">
+        <p14:creationId xmlns:p14="http://schemas.microsoft.com/office/powerpoint/2010/main" val="701747366"/>
+      </p:ext>
+    </p:extLst>
+  </p:cSld>
+  <p:clrMapOvr>
+    <a:masterClrMapping/>
+  </p:clrMapOvr>
+</p:sldLayout>
+</file>
+
+<file path=ppt/slideLayouts/slideLayout22.xml><?xml version="1.0" encoding="utf-8"?>
+<p:sldLayout xmlns:a="http://schemas.openxmlformats.org/drawingml/2006/main" xmlns:r="http://schemas.openxmlformats.org/officeDocument/2006/relationships" xmlns:p="http://schemas.openxmlformats.org/presentationml/2006/main" type="blank" preserve="1">
+  <p:cSld name="Blank">
+    <p:spTree>
+      <p:nvGrpSpPr>
+        <p:cNvPr id="1" name=""/>
+        <p:cNvGrpSpPr/>
+        <p:nvPr/>
+      </p:nvGrpSpPr>
+      <p:grpSpPr>
+        <a:xfrm>
+          <a:off x="0" y="0"/>
+          <a:ext cx="0" cy="0"/>
+          <a:chOff x="0" y="0"/>
+          <a:chExt cx="0" cy="0"/>
+        </a:xfrm>
+      </p:grpSpPr>
+      <p:sp>
+        <p:nvSpPr>
+          <p:cNvPr id="2" name="Date Placeholder 1">
+            <a:extLst>
+              <a:ext uri="{FF2B5EF4-FFF2-40B4-BE49-F238E27FC236}">
+                <a16:creationId xmlns:a16="http://schemas.microsoft.com/office/drawing/2014/main" id="{AE65E154-0902-D444-BDAC-7BF1587067D5}"/>
+              </a:ext>
+            </a:extLst>
+          </p:cNvPr>
+          <p:cNvSpPr>
+            <a:spLocks noGrp="1"/>
+          </p:cNvSpPr>
+          <p:nvPr>
+            <p:ph type="dt" sz="half" idx="10"/>
+          </p:nvPr>
+        </p:nvSpPr>
+        <p:spPr/>
+        <p:txBody>
+          <a:bodyPr/>
+          <a:lstStyle/>
+          <a:p>
+            <a:fld id="{53FA46FA-1708-D043-B900-E932D5DF811C}" type="datetimeFigureOut">
+              <a:rPr lang="en-US" smtClean="0"/>
+              <a:t>7/18/19</a:t>
+            </a:fld>
+            <a:endParaRPr lang="en-US"/>
+          </a:p>
+        </p:txBody>
+      </p:sp>
+      <p:sp>
+        <p:nvSpPr>
+          <p:cNvPr id="3" name="Footer Placeholder 2">
+            <a:extLst>
+              <a:ext uri="{FF2B5EF4-FFF2-40B4-BE49-F238E27FC236}">
+                <a16:creationId xmlns:a16="http://schemas.microsoft.com/office/drawing/2014/main" id="{E82CB2FA-AC81-A44E-9602-5070D66F30AE}"/>
+              </a:ext>
+            </a:extLst>
+          </p:cNvPr>
+          <p:cNvSpPr>
+            <a:spLocks noGrp="1"/>
+          </p:cNvSpPr>
+          <p:nvPr>
+            <p:ph type="ftr" sz="quarter" idx="11"/>
+          </p:nvPr>
+        </p:nvSpPr>
+        <p:spPr/>
+        <p:txBody>
+          <a:bodyPr/>
+          <a:lstStyle/>
+          <a:p>
+            <a:endParaRPr lang="en-US"/>
+          </a:p>
+        </p:txBody>
+      </p:sp>
+      <p:sp>
+        <p:nvSpPr>
+          <p:cNvPr id="4" name="Slide Number Placeholder 3">
+            <a:extLst>
+              <a:ext uri="{FF2B5EF4-FFF2-40B4-BE49-F238E27FC236}">
+                <a16:creationId xmlns:a16="http://schemas.microsoft.com/office/drawing/2014/main" id="{94DA83B7-4CA1-C14F-9572-6AAFC927C31E}"/>
+              </a:ext>
+            </a:extLst>
+          </p:cNvPr>
+          <p:cNvSpPr>
+            <a:spLocks noGrp="1"/>
+          </p:cNvSpPr>
+          <p:nvPr>
+            <p:ph type="sldNum" sz="quarter" idx="12"/>
+          </p:nvPr>
+        </p:nvSpPr>
+        <p:spPr/>
+        <p:txBody>
+          <a:bodyPr/>
+          <a:lstStyle/>
+          <a:p>
+            <a:fld id="{86CB4B4D-7CA3-9044-876B-883B54F8677D}" type="slidenum">
+              <a:rPr lang="en-US" smtClean="0"/>
+              <a:t>‹#›</a:t>
+            </a:fld>
+            <a:endParaRPr lang="en-US"/>
+          </a:p>
+        </p:txBody>
+      </p:sp>
+    </p:spTree>
+    <p:extLst>
+      <p:ext uri="{BB962C8B-B14F-4D97-AF65-F5344CB8AC3E}">
+        <p14:creationId xmlns:p14="http://schemas.microsoft.com/office/powerpoint/2010/main" val="1707304428"/>
+      </p:ext>
+    </p:extLst>
+  </p:cSld>
+  <p:clrMapOvr>
+    <a:masterClrMapping/>
+  </p:clrMapOvr>
+</p:sldLayout>
+</file>
+
+<file path=ppt/slideLayouts/slideLayout23.xml><?xml version="1.0" encoding="utf-8"?>
+<p:sldLayout xmlns:a="http://schemas.openxmlformats.org/drawingml/2006/main" xmlns:r="http://schemas.openxmlformats.org/officeDocument/2006/relationships" xmlns:p="http://schemas.openxmlformats.org/presentationml/2006/main" type="objTx" preserve="1">
+  <p:cSld name="Content with Caption">
+    <p:spTree>
+      <p:nvGrpSpPr>
+        <p:cNvPr id="1" name=""/>
+        <p:cNvGrpSpPr/>
+        <p:nvPr/>
+      </p:nvGrpSpPr>
+      <p:grpSpPr>
+        <a:xfrm>
+          <a:off x="0" y="0"/>
+          <a:ext cx="0" cy="0"/>
+          <a:chOff x="0" y="0"/>
+          <a:chExt cx="0" cy="0"/>
+        </a:xfrm>
+      </p:grpSpPr>
+      <p:sp>
+        <p:nvSpPr>
+          <p:cNvPr id="2" name="Title 1">
+            <a:extLst>
+              <a:ext uri="{FF2B5EF4-FFF2-40B4-BE49-F238E27FC236}">
+                <a16:creationId xmlns:a16="http://schemas.microsoft.com/office/drawing/2014/main" id="{465BB668-734F-434E-8C65-0C3D8ADD9CE5}"/>
+              </a:ext>
+            </a:extLst>
+          </p:cNvPr>
+          <p:cNvSpPr>
+            <a:spLocks noGrp="1"/>
+          </p:cNvSpPr>
+          <p:nvPr>
+            <p:ph type="title"/>
+          </p:nvPr>
+        </p:nvSpPr>
+        <p:spPr>
+          <a:xfrm>
+            <a:off x="839788" y="457200"/>
+            <a:ext cx="3932237" cy="1600200"/>
+          </a:xfrm>
+        </p:spPr>
+        <p:txBody>
+          <a:bodyPr anchor="b"/>
+          <a:lstStyle>
+            <a:lvl1pPr>
+              <a:defRPr sz="3200"/>
+            </a:lvl1pPr>
+          </a:lstStyle>
+          <a:p>
+            <a:r>
+              <a:rPr lang="en-US"/>
+              <a:t>Click to edit Master title style</a:t>
+            </a:r>
+          </a:p>
+        </p:txBody>
+      </p:sp>
+      <p:sp>
+        <p:nvSpPr>
+          <p:cNvPr id="3" name="Content Placeholder 2">
+            <a:extLst>
+              <a:ext uri="{FF2B5EF4-FFF2-40B4-BE49-F238E27FC236}">
+                <a16:creationId xmlns:a16="http://schemas.microsoft.com/office/drawing/2014/main" id="{BD91B847-A59D-1149-911A-88CE0E620874}"/>
+              </a:ext>
+            </a:extLst>
+          </p:cNvPr>
+          <p:cNvSpPr>
+            <a:spLocks noGrp="1"/>
+          </p:cNvSpPr>
+          <p:nvPr>
+            <p:ph idx="1"/>
+          </p:nvPr>
+        </p:nvSpPr>
+        <p:spPr>
+          <a:xfrm>
+            <a:off x="5183188" y="987425"/>
+            <a:ext cx="6172200" cy="4873625"/>
+          </a:xfrm>
+        </p:spPr>
+        <p:txBody>
+          <a:bodyPr/>
+          <a:lstStyle>
+            <a:lvl1pPr>
+              <a:defRPr sz="3200"/>
+            </a:lvl1pPr>
+            <a:lvl2pPr>
+              <a:defRPr sz="2800"/>
+            </a:lvl2pPr>
+            <a:lvl3pPr>
+              <a:defRPr sz="2400"/>
+            </a:lvl3pPr>
+            <a:lvl4pPr>
+              <a:defRPr sz="2000"/>
+            </a:lvl4pPr>
+            <a:lvl5pPr>
+              <a:defRPr sz="2000"/>
+            </a:lvl5pPr>
+            <a:lvl6pPr>
+              <a:defRPr sz="2000"/>
+            </a:lvl6pPr>
+            <a:lvl7pPr>
+              <a:defRPr sz="2000"/>
+            </a:lvl7pPr>
+            <a:lvl8pPr>
+              <a:defRPr sz="2000"/>
+            </a:lvl8pPr>
+            <a:lvl9pPr>
+              <a:defRPr sz="2000"/>
+            </a:lvl9pPr>
+          </a:lstStyle>
+          <a:p>
+            <a:pPr lvl="0"/>
+            <a:r>
+              <a:rPr lang="en-US"/>
+              <a:t>Click to edit Master text styles</a:t>
+            </a:r>
+          </a:p>
+          <a:p>
+            <a:pPr lvl="1"/>
+            <a:r>
+              <a:rPr lang="en-US"/>
+              <a:t>Second level</a:t>
+            </a:r>
+          </a:p>
+          <a:p>
+            <a:pPr lvl="2"/>
+            <a:r>
+              <a:rPr lang="en-US"/>
+              <a:t>Third level</a:t>
+            </a:r>
+          </a:p>
+          <a:p>
+            <a:pPr lvl="3"/>
+            <a:r>
+              <a:rPr lang="en-US"/>
+              <a:t>Fourth level</a:t>
+            </a:r>
+          </a:p>
+          <a:p>
+            <a:pPr lvl="4"/>
+            <a:r>
+              <a:rPr lang="en-US"/>
+              <a:t>Fifth level</a:t>
+            </a:r>
+          </a:p>
+        </p:txBody>
+      </p:sp>
+      <p:sp>
+        <p:nvSpPr>
+          <p:cNvPr id="4" name="Text Placeholder 3">
+            <a:extLst>
+              <a:ext uri="{FF2B5EF4-FFF2-40B4-BE49-F238E27FC236}">
+                <a16:creationId xmlns:a16="http://schemas.microsoft.com/office/drawing/2014/main" id="{89DA6553-0EA3-1841-A291-E902F5AE486C}"/>
+              </a:ext>
+            </a:extLst>
+          </p:cNvPr>
+          <p:cNvSpPr>
+            <a:spLocks noGrp="1"/>
+          </p:cNvSpPr>
+          <p:nvPr>
+            <p:ph type="body" sz="half" idx="2"/>
+          </p:nvPr>
+        </p:nvSpPr>
+        <p:spPr>
+          <a:xfrm>
+            <a:off x="839788" y="2057400"/>
+            <a:ext cx="3932237" cy="3811588"/>
+          </a:xfrm>
+        </p:spPr>
+        <p:txBody>
+          <a:bodyPr/>
+          <a:lstStyle>
+            <a:lvl1pPr marL="0" indent="0">
+              <a:buNone/>
+              <a:defRPr sz="1600"/>
+            </a:lvl1pPr>
+            <a:lvl2pPr marL="457200" indent="0">
+              <a:buNone/>
+              <a:defRPr sz="1400"/>
+            </a:lvl2pPr>
+            <a:lvl3pPr marL="914400" indent="0">
+              <a:buNone/>
+              <a:defRPr sz="1200"/>
+            </a:lvl3pPr>
+            <a:lvl4pPr marL="1371600" indent="0">
+              <a:buNone/>
+              <a:defRPr sz="1000"/>
+            </a:lvl4pPr>
+            <a:lvl5pPr marL="1828800" indent="0">
+              <a:buNone/>
+              <a:defRPr sz="1000"/>
+            </a:lvl5pPr>
+            <a:lvl6pPr marL="2286000" indent="0">
+              <a:buNone/>
+              <a:defRPr sz="1000"/>
+            </a:lvl6pPr>
+            <a:lvl7pPr marL="2743200" indent="0">
+              <a:buNone/>
+              <a:defRPr sz="1000"/>
+            </a:lvl7pPr>
+            <a:lvl8pPr marL="3200400" indent="0">
+              <a:buNone/>
+              <a:defRPr sz="1000"/>
+            </a:lvl8pPr>
+            <a:lvl9pPr marL="3657600" indent="0">
+              <a:buNone/>
+              <a:defRPr sz="1000"/>
+            </a:lvl9pPr>
+          </a:lstStyle>
+          <a:p>
+            <a:pPr lvl="0"/>
+            <a:r>
+              <a:rPr lang="en-US"/>
+              <a:t>Click to edit Master text styles</a:t>
+            </a:r>
+          </a:p>
+        </p:txBody>
+      </p:sp>
+      <p:sp>
+        <p:nvSpPr>
+          <p:cNvPr id="5" name="Date Placeholder 4">
+            <a:extLst>
+              <a:ext uri="{FF2B5EF4-FFF2-40B4-BE49-F238E27FC236}">
+                <a16:creationId xmlns:a16="http://schemas.microsoft.com/office/drawing/2014/main" id="{70BD5529-F5D9-E543-8750-33F25B9C11CF}"/>
+              </a:ext>
+            </a:extLst>
+          </p:cNvPr>
+          <p:cNvSpPr>
+            <a:spLocks noGrp="1"/>
+          </p:cNvSpPr>
+          <p:nvPr>
+            <p:ph type="dt" sz="half" idx="10"/>
+          </p:nvPr>
+        </p:nvSpPr>
+        <p:spPr/>
+        <p:txBody>
+          <a:bodyPr/>
+          <a:lstStyle/>
+          <a:p>
+            <a:fld id="{53FA46FA-1708-D043-B900-E932D5DF811C}" type="datetimeFigureOut">
+              <a:rPr lang="en-US" smtClean="0"/>
+              <a:t>7/18/19</a:t>
+            </a:fld>
+            <a:endParaRPr lang="en-US"/>
+          </a:p>
+        </p:txBody>
+      </p:sp>
+      <p:sp>
+        <p:nvSpPr>
+          <p:cNvPr id="6" name="Footer Placeholder 5">
+            <a:extLst>
+              <a:ext uri="{FF2B5EF4-FFF2-40B4-BE49-F238E27FC236}">
+                <a16:creationId xmlns:a16="http://schemas.microsoft.com/office/drawing/2014/main" id="{82523804-9EAB-C345-9B95-907C792A40E3}"/>
+              </a:ext>
+            </a:extLst>
+          </p:cNvPr>
+          <p:cNvSpPr>
+            <a:spLocks noGrp="1"/>
+          </p:cNvSpPr>
+          <p:nvPr>
+            <p:ph type="ftr" sz="quarter" idx="11"/>
+          </p:nvPr>
+        </p:nvSpPr>
+        <p:spPr/>
+        <p:txBody>
+          <a:bodyPr/>
+          <a:lstStyle/>
+          <a:p>
+            <a:endParaRPr lang="en-US"/>
+          </a:p>
+        </p:txBody>
+      </p:sp>
+      <p:sp>
+        <p:nvSpPr>
+          <p:cNvPr id="7" name="Slide Number Placeholder 6">
+            <a:extLst>
+              <a:ext uri="{FF2B5EF4-FFF2-40B4-BE49-F238E27FC236}">
+                <a16:creationId xmlns:a16="http://schemas.microsoft.com/office/drawing/2014/main" id="{05823551-59AC-274A-87A3-E9B6E852C067}"/>
+              </a:ext>
+            </a:extLst>
+          </p:cNvPr>
+          <p:cNvSpPr>
+            <a:spLocks noGrp="1"/>
+          </p:cNvSpPr>
+          <p:nvPr>
+            <p:ph type="sldNum" sz="quarter" idx="12"/>
+          </p:nvPr>
+        </p:nvSpPr>
+        <p:spPr/>
+        <p:txBody>
+          <a:bodyPr/>
+          <a:lstStyle/>
+          <a:p>
+            <a:fld id="{86CB4B4D-7CA3-9044-876B-883B54F8677D}" type="slidenum">
+              <a:rPr lang="en-US" smtClean="0"/>
+              <a:t>‹#›</a:t>
+            </a:fld>
+            <a:endParaRPr lang="en-US"/>
+          </a:p>
+        </p:txBody>
+      </p:sp>
+    </p:spTree>
+    <p:extLst>
+      <p:ext uri="{BB962C8B-B14F-4D97-AF65-F5344CB8AC3E}">
+        <p14:creationId xmlns:p14="http://schemas.microsoft.com/office/powerpoint/2010/main" val="1374286227"/>
+      </p:ext>
+    </p:extLst>
+  </p:cSld>
+  <p:clrMapOvr>
+    <a:masterClrMapping/>
+  </p:clrMapOvr>
+</p:sldLayout>
+</file>
+
+<file path=ppt/slideLayouts/slideLayout24.xml><?xml version="1.0" encoding="utf-8"?>
+<p:sldLayout xmlns:a="http://schemas.openxmlformats.org/drawingml/2006/main" xmlns:r="http://schemas.openxmlformats.org/officeDocument/2006/relationships" xmlns:p="http://schemas.openxmlformats.org/presentationml/2006/main" type="picTx" preserve="1">
+  <p:cSld name="Picture with Caption">
+    <p:spTree>
+      <p:nvGrpSpPr>
+        <p:cNvPr id="1" name=""/>
+        <p:cNvGrpSpPr/>
+        <p:nvPr/>
+      </p:nvGrpSpPr>
+      <p:grpSpPr>
+        <a:xfrm>
+          <a:off x="0" y="0"/>
+          <a:ext cx="0" cy="0"/>
+          <a:chOff x="0" y="0"/>
+          <a:chExt cx="0" cy="0"/>
+        </a:xfrm>
+      </p:grpSpPr>
+      <p:sp>
+        <p:nvSpPr>
+          <p:cNvPr id="2" name="Title 1">
+            <a:extLst>
+              <a:ext uri="{FF2B5EF4-FFF2-40B4-BE49-F238E27FC236}">
+                <a16:creationId xmlns:a16="http://schemas.microsoft.com/office/drawing/2014/main" id="{867E013E-4AFD-2E4B-B51C-DDAD7574A884}"/>
+              </a:ext>
+            </a:extLst>
+          </p:cNvPr>
+          <p:cNvSpPr>
+            <a:spLocks noGrp="1"/>
+          </p:cNvSpPr>
+          <p:nvPr>
+            <p:ph type="title"/>
+          </p:nvPr>
+        </p:nvSpPr>
+        <p:spPr>
+          <a:xfrm>
+            <a:off x="839788" y="457200"/>
+            <a:ext cx="3932237" cy="1600200"/>
+          </a:xfrm>
+        </p:spPr>
+        <p:txBody>
+          <a:bodyPr anchor="b"/>
+          <a:lstStyle>
+            <a:lvl1pPr>
+              <a:defRPr sz="3200"/>
+            </a:lvl1pPr>
+          </a:lstStyle>
+          <a:p>
+            <a:r>
+              <a:rPr lang="en-US"/>
+              <a:t>Click to edit Master title style</a:t>
+            </a:r>
+          </a:p>
+        </p:txBody>
+      </p:sp>
+      <p:sp>
+        <p:nvSpPr>
+          <p:cNvPr id="3" name="Picture Placeholder 2">
+            <a:extLst>
+              <a:ext uri="{FF2B5EF4-FFF2-40B4-BE49-F238E27FC236}">
+                <a16:creationId xmlns:a16="http://schemas.microsoft.com/office/drawing/2014/main" id="{BD6A9FE0-B230-2A45-ACC9-A5C189BEFC18}"/>
+              </a:ext>
+            </a:extLst>
+          </p:cNvPr>
+          <p:cNvSpPr>
+            <a:spLocks noGrp="1"/>
+          </p:cNvSpPr>
+          <p:nvPr>
+            <p:ph type="pic" idx="1"/>
+          </p:nvPr>
+        </p:nvSpPr>
+        <p:spPr>
+          <a:xfrm>
+            <a:off x="5183188" y="987425"/>
+            <a:ext cx="6172200" cy="4873625"/>
+          </a:xfrm>
+        </p:spPr>
+        <p:txBody>
+          <a:bodyPr/>
+          <a:lstStyle>
+            <a:lvl1pPr marL="0" indent="0">
+              <a:buNone/>
+              <a:defRPr sz="3200"/>
+            </a:lvl1pPr>
+            <a:lvl2pPr marL="457200" indent="0">
+              <a:buNone/>
+              <a:defRPr sz="2800"/>
+            </a:lvl2pPr>
+            <a:lvl3pPr marL="914400" indent="0">
+              <a:buNone/>
+              <a:defRPr sz="2400"/>
+            </a:lvl3pPr>
+            <a:lvl4pPr marL="1371600" indent="0">
+              <a:buNone/>
+              <a:defRPr sz="2000"/>
+            </a:lvl4pPr>
+            <a:lvl5pPr marL="1828800" indent="0">
+              <a:buNone/>
+              <a:defRPr sz="2000"/>
+            </a:lvl5pPr>
+            <a:lvl6pPr marL="2286000" indent="0">
+              <a:buNone/>
+              <a:defRPr sz="2000"/>
+            </a:lvl6pPr>
+            <a:lvl7pPr marL="2743200" indent="0">
+              <a:buNone/>
+              <a:defRPr sz="2000"/>
+            </a:lvl7pPr>
+            <a:lvl8pPr marL="3200400" indent="0">
+              <a:buNone/>
+              <a:defRPr sz="2000"/>
+            </a:lvl8pPr>
+            <a:lvl9pPr marL="3657600" indent="0">
+              <a:buNone/>
+              <a:defRPr sz="2000"/>
+            </a:lvl9pPr>
+          </a:lstStyle>
+          <a:p>
+            <a:endParaRPr lang="en-US"/>
+          </a:p>
+        </p:txBody>
+      </p:sp>
+      <p:sp>
+        <p:nvSpPr>
+          <p:cNvPr id="4" name="Text Placeholder 3">
+            <a:extLst>
+              <a:ext uri="{FF2B5EF4-FFF2-40B4-BE49-F238E27FC236}">
+                <a16:creationId xmlns:a16="http://schemas.microsoft.com/office/drawing/2014/main" id="{8346BBCC-2145-4047-88F0-312BFA05FBEA}"/>
+              </a:ext>
+            </a:extLst>
+          </p:cNvPr>
+          <p:cNvSpPr>
+            <a:spLocks noGrp="1"/>
+          </p:cNvSpPr>
+          <p:nvPr>
+            <p:ph type="body" sz="half" idx="2"/>
+          </p:nvPr>
+        </p:nvSpPr>
+        <p:spPr>
+          <a:xfrm>
+            <a:off x="839788" y="2057400"/>
+            <a:ext cx="3932237" cy="3811588"/>
+          </a:xfrm>
+        </p:spPr>
+        <p:txBody>
+          <a:bodyPr/>
+          <a:lstStyle>
+            <a:lvl1pPr marL="0" indent="0">
+              <a:buNone/>
+              <a:defRPr sz="1600"/>
+            </a:lvl1pPr>
+            <a:lvl2pPr marL="457200" indent="0">
+              <a:buNone/>
+              <a:defRPr sz="1400"/>
+            </a:lvl2pPr>
+            <a:lvl3pPr marL="914400" indent="0">
+              <a:buNone/>
+              <a:defRPr sz="1200"/>
+            </a:lvl3pPr>
+            <a:lvl4pPr marL="1371600" indent="0">
+              <a:buNone/>
+              <a:defRPr sz="1000"/>
+            </a:lvl4pPr>
+            <a:lvl5pPr marL="1828800" indent="0">
+              <a:buNone/>
+              <a:defRPr sz="1000"/>
+            </a:lvl5pPr>
+            <a:lvl6pPr marL="2286000" indent="0">
+              <a:buNone/>
+              <a:defRPr sz="1000"/>
+            </a:lvl6pPr>
+            <a:lvl7pPr marL="2743200" indent="0">
+              <a:buNone/>
+              <a:defRPr sz="1000"/>
+            </a:lvl7pPr>
+            <a:lvl8pPr marL="3200400" indent="0">
+              <a:buNone/>
+              <a:defRPr sz="1000"/>
+            </a:lvl8pPr>
+            <a:lvl9pPr marL="3657600" indent="0">
+              <a:buNone/>
+              <a:defRPr sz="1000"/>
+            </a:lvl9pPr>
+          </a:lstStyle>
+          <a:p>
+            <a:pPr lvl="0"/>
+            <a:r>
+              <a:rPr lang="en-US"/>
+              <a:t>Click to edit Master text styles</a:t>
+            </a:r>
+          </a:p>
+        </p:txBody>
+      </p:sp>
+      <p:sp>
+        <p:nvSpPr>
+          <p:cNvPr id="5" name="Date Placeholder 4">
+            <a:extLst>
+              <a:ext uri="{FF2B5EF4-FFF2-40B4-BE49-F238E27FC236}">
+                <a16:creationId xmlns:a16="http://schemas.microsoft.com/office/drawing/2014/main" id="{81F729DF-C4C0-6347-A4A5-547555BF1018}"/>
+              </a:ext>
+            </a:extLst>
+          </p:cNvPr>
+          <p:cNvSpPr>
+            <a:spLocks noGrp="1"/>
+          </p:cNvSpPr>
+          <p:nvPr>
+            <p:ph type="dt" sz="half" idx="10"/>
+          </p:nvPr>
+        </p:nvSpPr>
+        <p:spPr/>
+        <p:txBody>
+          <a:bodyPr/>
+          <a:lstStyle/>
+          <a:p>
+            <a:fld id="{53FA46FA-1708-D043-B900-E932D5DF811C}" type="datetimeFigureOut">
+              <a:rPr lang="en-US" smtClean="0"/>
+              <a:t>7/18/19</a:t>
+            </a:fld>
+            <a:endParaRPr lang="en-US"/>
+          </a:p>
+        </p:txBody>
+      </p:sp>
+      <p:sp>
+        <p:nvSpPr>
+          <p:cNvPr id="6" name="Footer Placeholder 5">
+            <a:extLst>
+              <a:ext uri="{FF2B5EF4-FFF2-40B4-BE49-F238E27FC236}">
+                <a16:creationId xmlns:a16="http://schemas.microsoft.com/office/drawing/2014/main" id="{CA162436-D5EF-C44D-9542-C07746FE1EF5}"/>
+              </a:ext>
+            </a:extLst>
+          </p:cNvPr>
+          <p:cNvSpPr>
+            <a:spLocks noGrp="1"/>
+          </p:cNvSpPr>
+          <p:nvPr>
+            <p:ph type="ftr" sz="quarter" idx="11"/>
+          </p:nvPr>
+        </p:nvSpPr>
+        <p:spPr/>
+        <p:txBody>
+          <a:bodyPr/>
+          <a:lstStyle/>
+          <a:p>
+            <a:endParaRPr lang="en-US"/>
+          </a:p>
+        </p:txBody>
+      </p:sp>
+      <p:sp>
+        <p:nvSpPr>
+          <p:cNvPr id="7" name="Slide Number Placeholder 6">
+            <a:extLst>
+              <a:ext uri="{FF2B5EF4-FFF2-40B4-BE49-F238E27FC236}">
+                <a16:creationId xmlns:a16="http://schemas.microsoft.com/office/drawing/2014/main" id="{DDB98956-476B-0349-A673-DF3FD2951081}"/>
+              </a:ext>
+            </a:extLst>
+          </p:cNvPr>
+          <p:cNvSpPr>
+            <a:spLocks noGrp="1"/>
+          </p:cNvSpPr>
+          <p:nvPr>
+            <p:ph type="sldNum" sz="quarter" idx="12"/>
+          </p:nvPr>
+        </p:nvSpPr>
+        <p:spPr/>
+        <p:txBody>
+          <a:bodyPr/>
+          <a:lstStyle/>
+          <a:p>
+            <a:fld id="{86CB4B4D-7CA3-9044-876B-883B54F8677D}" type="slidenum">
+              <a:rPr lang="en-US" smtClean="0"/>
+              <a:t>‹#›</a:t>
+            </a:fld>
+            <a:endParaRPr lang="en-US"/>
+          </a:p>
+        </p:txBody>
+      </p:sp>
+    </p:spTree>
+    <p:extLst>
+      <p:ext uri="{BB962C8B-B14F-4D97-AF65-F5344CB8AC3E}">
+        <p14:creationId xmlns:p14="http://schemas.microsoft.com/office/powerpoint/2010/main" val="3109371663"/>
+      </p:ext>
+    </p:extLst>
+  </p:cSld>
+  <p:clrMapOvr>
+    <a:masterClrMapping/>
+  </p:clrMapOvr>
+</p:sldLayout>
+</file>
+
+<file path=ppt/slideLayouts/slideLayout25.xml><?xml version="1.0" encoding="utf-8"?>
+<p:sldLayout xmlns:a="http://schemas.openxmlformats.org/drawingml/2006/main" xmlns:r="http://schemas.openxmlformats.org/officeDocument/2006/relationships" xmlns:p="http://schemas.openxmlformats.org/presentationml/2006/main" type="vertTx" preserve="1">
+  <p:cSld name="Title and Vertical Text">
+    <p:spTree>
+      <p:nvGrpSpPr>
+        <p:cNvPr id="1" name=""/>
+        <p:cNvGrpSpPr/>
+        <p:nvPr/>
+      </p:nvGrpSpPr>
+      <p:grpSpPr>
+        <a:xfrm>
+          <a:off x="0" y="0"/>
+          <a:ext cx="0" cy="0"/>
+          <a:chOff x="0" y="0"/>
+          <a:chExt cx="0" cy="0"/>
+        </a:xfrm>
+      </p:grpSpPr>
+      <p:sp>
+        <p:nvSpPr>
+          <p:cNvPr id="2" name="Title 1">
+            <a:extLst>
+              <a:ext uri="{FF2B5EF4-FFF2-40B4-BE49-F238E27FC236}">
+                <a16:creationId xmlns:a16="http://schemas.microsoft.com/office/drawing/2014/main" id="{AF5C4BE4-4BED-2243-867C-54DD0BE8C226}"/>
+              </a:ext>
+            </a:extLst>
+          </p:cNvPr>
+          <p:cNvSpPr>
+            <a:spLocks noGrp="1"/>
+          </p:cNvSpPr>
+          <p:nvPr>
+            <p:ph type="title"/>
+          </p:nvPr>
+        </p:nvSpPr>
+        <p:spPr/>
+        <p:txBody>
+          <a:bodyPr/>
+          <a:lstStyle/>
+          <a:p>
+            <a:r>
+              <a:rPr lang="en-US"/>
+              <a:t>Click to edit Master title style</a:t>
+            </a:r>
+          </a:p>
+        </p:txBody>
+      </p:sp>
+      <p:sp>
+        <p:nvSpPr>
+          <p:cNvPr id="3" name="Vertical Text Placeholder 2">
+            <a:extLst>
+              <a:ext uri="{FF2B5EF4-FFF2-40B4-BE49-F238E27FC236}">
+                <a16:creationId xmlns:a16="http://schemas.microsoft.com/office/drawing/2014/main" id="{0A4B514A-CE7F-8149-BB57-BEABEA627AB6}"/>
+              </a:ext>
+            </a:extLst>
+          </p:cNvPr>
+          <p:cNvSpPr>
+            <a:spLocks noGrp="1"/>
+          </p:cNvSpPr>
+          <p:nvPr>
+            <p:ph type="body" orient="vert" idx="1"/>
+          </p:nvPr>
+        </p:nvSpPr>
+        <p:spPr/>
+        <p:txBody>
+          <a:bodyPr vert="eaVert"/>
+          <a:lstStyle/>
+          <a:p>
+            <a:pPr lvl="0"/>
+            <a:r>
+              <a:rPr lang="en-US"/>
+              <a:t>Click to edit Master text styles</a:t>
+            </a:r>
+          </a:p>
+          <a:p>
+            <a:pPr lvl="1"/>
+            <a:r>
+              <a:rPr lang="en-US"/>
+              <a:t>Second level</a:t>
+            </a:r>
+          </a:p>
+          <a:p>
+            <a:pPr lvl="2"/>
+            <a:r>
+              <a:rPr lang="en-US"/>
+              <a:t>Third level</a:t>
+            </a:r>
+          </a:p>
+          <a:p>
+            <a:pPr lvl="3"/>
+            <a:r>
+              <a:rPr lang="en-US"/>
+              <a:t>Fourth level</a:t>
+            </a:r>
+          </a:p>
+          <a:p>
+            <a:pPr lvl="4"/>
+            <a:r>
+              <a:rPr lang="en-US"/>
+              <a:t>Fifth level</a:t>
+            </a:r>
+          </a:p>
+        </p:txBody>
+      </p:sp>
+      <p:sp>
+        <p:nvSpPr>
+          <p:cNvPr id="4" name="Date Placeholder 3">
+            <a:extLst>
+              <a:ext uri="{FF2B5EF4-FFF2-40B4-BE49-F238E27FC236}">
+                <a16:creationId xmlns:a16="http://schemas.microsoft.com/office/drawing/2014/main" id="{02721649-69C0-EF44-814F-318028F31370}"/>
+              </a:ext>
+            </a:extLst>
+          </p:cNvPr>
+          <p:cNvSpPr>
+            <a:spLocks noGrp="1"/>
+          </p:cNvSpPr>
+          <p:nvPr>
+            <p:ph type="dt" sz="half" idx="10"/>
+          </p:nvPr>
+        </p:nvSpPr>
+        <p:spPr/>
+        <p:txBody>
+          <a:bodyPr/>
+          <a:lstStyle/>
+          <a:p>
+            <a:fld id="{53FA46FA-1708-D043-B900-E932D5DF811C}" type="datetimeFigureOut">
+              <a:rPr lang="en-US" smtClean="0"/>
+              <a:t>7/18/19</a:t>
+            </a:fld>
+            <a:endParaRPr lang="en-US"/>
+          </a:p>
+        </p:txBody>
+      </p:sp>
+      <p:sp>
+        <p:nvSpPr>
+          <p:cNvPr id="5" name="Footer Placeholder 4">
+            <a:extLst>
+              <a:ext uri="{FF2B5EF4-FFF2-40B4-BE49-F238E27FC236}">
+                <a16:creationId xmlns:a16="http://schemas.microsoft.com/office/drawing/2014/main" id="{B4A5700C-4FFC-E840-9373-EE76EF114C66}"/>
+              </a:ext>
+            </a:extLst>
+          </p:cNvPr>
+          <p:cNvSpPr>
+            <a:spLocks noGrp="1"/>
+          </p:cNvSpPr>
+          <p:nvPr>
+            <p:ph type="ftr" sz="quarter" idx="11"/>
+          </p:nvPr>
+        </p:nvSpPr>
+        <p:spPr/>
+        <p:txBody>
+          <a:bodyPr/>
+          <a:lstStyle/>
+          <a:p>
+            <a:endParaRPr lang="en-US"/>
+          </a:p>
+        </p:txBody>
+      </p:sp>
+      <p:sp>
+        <p:nvSpPr>
+          <p:cNvPr id="6" name="Slide Number Placeholder 5">
+            <a:extLst>
+              <a:ext uri="{FF2B5EF4-FFF2-40B4-BE49-F238E27FC236}">
+                <a16:creationId xmlns:a16="http://schemas.microsoft.com/office/drawing/2014/main" id="{34AD7A5A-F458-724C-9CA2-9065FA391035}"/>
+              </a:ext>
+            </a:extLst>
+          </p:cNvPr>
+          <p:cNvSpPr>
+            <a:spLocks noGrp="1"/>
+          </p:cNvSpPr>
+          <p:nvPr>
+            <p:ph type="sldNum" sz="quarter" idx="12"/>
+          </p:nvPr>
+        </p:nvSpPr>
+        <p:spPr/>
+        <p:txBody>
+          <a:bodyPr/>
+          <a:lstStyle/>
+          <a:p>
+            <a:fld id="{86CB4B4D-7CA3-9044-876B-883B54F8677D}" type="slidenum">
+              <a:rPr lang="en-US" smtClean="0"/>
+              <a:t>‹#›</a:t>
+            </a:fld>
+            <a:endParaRPr lang="en-US"/>
+          </a:p>
+        </p:txBody>
+      </p:sp>
+    </p:spTree>
+    <p:extLst>
+      <p:ext uri="{BB962C8B-B14F-4D97-AF65-F5344CB8AC3E}">
+        <p14:creationId xmlns:p14="http://schemas.microsoft.com/office/powerpoint/2010/main" val="2760770130"/>
+      </p:ext>
+    </p:extLst>
+  </p:cSld>
+  <p:clrMapOvr>
+    <a:masterClrMapping/>
+  </p:clrMapOvr>
+</p:sldLayout>
+</file>
+
+<file path=ppt/slideLayouts/slideLayout26.xml><?xml version="1.0" encoding="utf-8"?>
+<p:sldLayout xmlns:a="http://schemas.openxmlformats.org/drawingml/2006/main" xmlns:r="http://schemas.openxmlformats.org/officeDocument/2006/relationships" xmlns:p="http://schemas.openxmlformats.org/presentationml/2006/main" type="vertTitleAndTx" preserve="1">
+  <p:cSld name="Vertical Title and Text">
+    <p:spTree>
+      <p:nvGrpSpPr>
+        <p:cNvPr id="1" name=""/>
+        <p:cNvGrpSpPr/>
+        <p:nvPr/>
+      </p:nvGrpSpPr>
+      <p:grpSpPr>
+        <a:xfrm>
+          <a:off x="0" y="0"/>
+          <a:ext cx="0" cy="0"/>
+          <a:chOff x="0" y="0"/>
+          <a:chExt cx="0" cy="0"/>
+        </a:xfrm>
+      </p:grpSpPr>
+      <p:sp>
+        <p:nvSpPr>
+          <p:cNvPr id="2" name="Vertical Title 1">
+            <a:extLst>
+              <a:ext uri="{FF2B5EF4-FFF2-40B4-BE49-F238E27FC236}">
+                <a16:creationId xmlns:a16="http://schemas.microsoft.com/office/drawing/2014/main" id="{F0AC73B5-E4DE-8F45-8AAA-359ADE8E8AA4}"/>
+              </a:ext>
+            </a:extLst>
+          </p:cNvPr>
+          <p:cNvSpPr>
+            <a:spLocks noGrp="1"/>
+          </p:cNvSpPr>
+          <p:nvPr>
+            <p:ph type="title" orient="vert"/>
+          </p:nvPr>
+        </p:nvSpPr>
+        <p:spPr>
+          <a:xfrm>
+            <a:off x="8724900" y="365125"/>
+            <a:ext cx="2628900" cy="5811838"/>
+          </a:xfrm>
+        </p:spPr>
+        <p:txBody>
+          <a:bodyPr vert="eaVert"/>
+          <a:lstStyle/>
+          <a:p>
+            <a:r>
+              <a:rPr lang="en-US"/>
+              <a:t>Click to edit Master title style</a:t>
+            </a:r>
+          </a:p>
+        </p:txBody>
+      </p:sp>
+      <p:sp>
+        <p:nvSpPr>
+          <p:cNvPr id="3" name="Vertical Text Placeholder 2">
+            <a:extLst>
+              <a:ext uri="{FF2B5EF4-FFF2-40B4-BE49-F238E27FC236}">
+                <a16:creationId xmlns:a16="http://schemas.microsoft.com/office/drawing/2014/main" id="{AF39EEB1-29DB-314A-BC28-DD233BB74C7E}"/>
+              </a:ext>
+            </a:extLst>
+          </p:cNvPr>
+          <p:cNvSpPr>
+            <a:spLocks noGrp="1"/>
+          </p:cNvSpPr>
+          <p:nvPr>
+            <p:ph type="body" orient="vert" idx="1"/>
+          </p:nvPr>
+        </p:nvSpPr>
+        <p:spPr>
+          <a:xfrm>
+            <a:off x="838200" y="365125"/>
+            <a:ext cx="7734300" cy="5811838"/>
+          </a:xfrm>
+        </p:spPr>
+        <p:txBody>
+          <a:bodyPr vert="eaVert"/>
+          <a:lstStyle/>
+          <a:p>
+            <a:pPr lvl="0"/>
+            <a:r>
+              <a:rPr lang="en-US"/>
+              <a:t>Click to edit Master text styles</a:t>
+            </a:r>
+          </a:p>
+          <a:p>
+            <a:pPr lvl="1"/>
+            <a:r>
+              <a:rPr lang="en-US"/>
+              <a:t>Second level</a:t>
+            </a:r>
+          </a:p>
+          <a:p>
+            <a:pPr lvl="2"/>
+            <a:r>
+              <a:rPr lang="en-US"/>
+              <a:t>Third level</a:t>
+            </a:r>
+          </a:p>
+          <a:p>
+            <a:pPr lvl="3"/>
+            <a:r>
+              <a:rPr lang="en-US"/>
+              <a:t>Fourth level</a:t>
+            </a:r>
+          </a:p>
+          <a:p>
+            <a:pPr lvl="4"/>
+            <a:r>
+              <a:rPr lang="en-US"/>
+              <a:t>Fifth level</a:t>
+            </a:r>
+          </a:p>
+        </p:txBody>
+      </p:sp>
+      <p:sp>
+        <p:nvSpPr>
+          <p:cNvPr id="4" name="Date Placeholder 3">
+            <a:extLst>
+              <a:ext uri="{FF2B5EF4-FFF2-40B4-BE49-F238E27FC236}">
+                <a16:creationId xmlns:a16="http://schemas.microsoft.com/office/drawing/2014/main" id="{AE046BE2-AD12-E344-9B7F-A4E7DA52FD00}"/>
+              </a:ext>
+            </a:extLst>
+          </p:cNvPr>
+          <p:cNvSpPr>
+            <a:spLocks noGrp="1"/>
+          </p:cNvSpPr>
+          <p:nvPr>
+            <p:ph type="dt" sz="half" idx="10"/>
+          </p:nvPr>
+        </p:nvSpPr>
+        <p:spPr/>
+        <p:txBody>
+          <a:bodyPr/>
+          <a:lstStyle/>
+          <a:p>
+            <a:fld id="{53FA46FA-1708-D043-B900-E932D5DF811C}" type="datetimeFigureOut">
+              <a:rPr lang="en-US" smtClean="0"/>
+              <a:t>7/18/19</a:t>
+            </a:fld>
+            <a:endParaRPr lang="en-US"/>
+          </a:p>
+        </p:txBody>
+      </p:sp>
+      <p:sp>
+        <p:nvSpPr>
+          <p:cNvPr id="5" name="Footer Placeholder 4">
+            <a:extLst>
+              <a:ext uri="{FF2B5EF4-FFF2-40B4-BE49-F238E27FC236}">
+                <a16:creationId xmlns:a16="http://schemas.microsoft.com/office/drawing/2014/main" id="{3CF2615D-8F10-8046-BC4C-99312DE810C3}"/>
+              </a:ext>
+            </a:extLst>
+          </p:cNvPr>
+          <p:cNvSpPr>
+            <a:spLocks noGrp="1"/>
+          </p:cNvSpPr>
+          <p:nvPr>
+            <p:ph type="ftr" sz="quarter" idx="11"/>
+          </p:nvPr>
+        </p:nvSpPr>
+        <p:spPr/>
+        <p:txBody>
+          <a:bodyPr/>
+          <a:lstStyle/>
+          <a:p>
+            <a:endParaRPr lang="en-US"/>
+          </a:p>
+        </p:txBody>
+      </p:sp>
+      <p:sp>
+        <p:nvSpPr>
+          <p:cNvPr id="6" name="Slide Number Placeholder 5">
+            <a:extLst>
+              <a:ext uri="{FF2B5EF4-FFF2-40B4-BE49-F238E27FC236}">
+                <a16:creationId xmlns:a16="http://schemas.microsoft.com/office/drawing/2014/main" id="{D3818C25-22D1-B741-AA5C-5975C42D980E}"/>
+              </a:ext>
+            </a:extLst>
+          </p:cNvPr>
+          <p:cNvSpPr>
+            <a:spLocks noGrp="1"/>
+          </p:cNvSpPr>
+          <p:nvPr>
+            <p:ph type="sldNum" sz="quarter" idx="12"/>
+          </p:nvPr>
+        </p:nvSpPr>
+        <p:spPr/>
+        <p:txBody>
+          <a:bodyPr/>
+          <a:lstStyle/>
+          <a:p>
+            <a:fld id="{86CB4B4D-7CA3-9044-876B-883B54F8677D}" type="slidenum">
+              <a:rPr lang="en-US" smtClean="0"/>
+              <a:t>‹#›</a:t>
+            </a:fld>
+            <a:endParaRPr lang="en-US"/>
+          </a:p>
+        </p:txBody>
+      </p:sp>
+    </p:spTree>
+    <p:extLst>
+      <p:ext uri="{BB962C8B-B14F-4D97-AF65-F5344CB8AC3E}">
+        <p14:creationId xmlns:p14="http://schemas.microsoft.com/office/powerpoint/2010/main" val="4023163607"/>
+      </p:ext>
+    </p:extLst>
+  </p:cSld>
+  <p:clrMapOvr>
+    <a:masterClrMapping/>
+  </p:clrMapOvr>
+</p:sldLayout>
+</file>
+
+<file path=ppt/slideLayouts/slideLayout27.xml><?xml version="1.0" encoding="utf-8"?>
+<p:sldLayout xmlns:a="http://schemas.openxmlformats.org/drawingml/2006/main" xmlns:r="http://schemas.openxmlformats.org/officeDocument/2006/relationships" xmlns:p="http://schemas.openxmlformats.org/presentationml/2006/main" type="tx">
+  <p:cSld name="Blank Blue">
+    <p:spTree>
+      <p:nvGrpSpPr>
+        <p:cNvPr id="1" name=""/>
+        <p:cNvGrpSpPr/>
+        <p:nvPr/>
+      </p:nvGrpSpPr>
+      <p:grpSpPr>
+        <a:xfrm>
+          <a:off x="0" y="0"/>
+          <a:ext cx="0" cy="0"/>
+          <a:chOff x="0" y="0"/>
+          <a:chExt cx="0" cy="0"/>
+        </a:xfrm>
+      </p:grpSpPr>
+      <p:sp>
+        <p:nvSpPr>
+          <p:cNvPr id="135" name="Slide Number"/>
+          <p:cNvSpPr txBox="1">
+            <a:spLocks noGrp="1"/>
+          </p:cNvSpPr>
+          <p:nvPr>
+            <p:ph type="sldNum" sz="quarter" idx="2"/>
+          </p:nvPr>
+        </p:nvSpPr>
+        <p:spPr>
+          <a:prstGeom prst="rect">
+            <a:avLst/>
+          </a:prstGeom>
+        </p:spPr>
+        <p:txBody>
+          <a:bodyPr/>
+          <a:lstStyle/>
+          <a:p>
+            <a:fld id="{86CB4B4D-7CA3-9044-876B-883B54F8677D}" type="slidenum">
+              <a:t>‹#›</a:t>
+            </a:fld>
+            <a:endParaRPr/>
+          </a:p>
+        </p:txBody>
+      </p:sp>
+    </p:spTree>
+    <p:extLst>
+      <p:ext uri="{BB962C8B-B14F-4D97-AF65-F5344CB8AC3E}">
+        <p14:creationId xmlns:p14="http://schemas.microsoft.com/office/powerpoint/2010/main" val="1284666262"/>
       </p:ext>
     </p:extLst>
   </p:cSld>
@@ -2961,7 +5649,7 @@
           </a:ln>
           <a:extLst>
             <a:ext uri="{C572A759-6A51-4108-AA02-DFA0A04FC94B}">
-              <ma14:wrappingTextBoxFlag xmlns:ma14="http://schemas.microsoft.com/office/mac/drawingml/2011/main" xmlns:a14="http://schemas.microsoft.com/office/drawing/2010/main" xmlns:m="http://schemas.openxmlformats.org/officeDocument/2006/math" xmlns="" val="1"/>
+              <ma14:wrappingTextBoxFlag xmlns="" xmlns:m="http://schemas.openxmlformats.org/officeDocument/2006/math" xmlns:a14="http://schemas.microsoft.com/office/drawing/2010/main" xmlns:ma14="http://schemas.microsoft.com/office/mac/drawingml/2011/main" val="1"/>
             </a:ext>
           </a:extLst>
         </p:spPr>
@@ -3001,7 +5689,7 @@
           </a:ln>
           <a:extLst>
             <a:ext uri="{C572A759-6A51-4108-AA02-DFA0A04FC94B}">
-              <ma14:wrappingTextBoxFlag xmlns:ma14="http://schemas.microsoft.com/office/mac/drawingml/2011/main" xmlns:a14="http://schemas.microsoft.com/office/drawing/2010/main" xmlns:m="http://schemas.openxmlformats.org/officeDocument/2006/math" xmlns="" val="1"/>
+              <ma14:wrappingTextBoxFlag xmlns="" xmlns:m="http://schemas.openxmlformats.org/officeDocument/2006/math" xmlns:a14="http://schemas.microsoft.com/office/drawing/2010/main" xmlns:ma14="http://schemas.microsoft.com/office/mac/drawingml/2011/main" val="1"/>
             </a:ext>
           </a:extLst>
         </p:spPr>
@@ -3905,6 +6593,575 @@
 </p:sldMaster>
 </file>
 
+<file path=ppt/slideMasters/slideMaster2.xml><?xml version="1.0" encoding="utf-8"?>
+<p:sldMaster xmlns:a="http://schemas.openxmlformats.org/drawingml/2006/main" xmlns:r="http://schemas.openxmlformats.org/officeDocument/2006/relationships" xmlns:p="http://schemas.openxmlformats.org/presentationml/2006/main">
+  <p:cSld>
+    <p:bg>
+      <p:bgRef idx="1001">
+        <a:schemeClr val="bg1"/>
+      </p:bgRef>
+    </p:bg>
+    <p:spTree>
+      <p:nvGrpSpPr>
+        <p:cNvPr id="1" name=""/>
+        <p:cNvGrpSpPr/>
+        <p:nvPr/>
+      </p:nvGrpSpPr>
+      <p:grpSpPr>
+        <a:xfrm>
+          <a:off x="0" y="0"/>
+          <a:ext cx="0" cy="0"/>
+          <a:chOff x="0" y="0"/>
+          <a:chExt cx="0" cy="0"/>
+        </a:xfrm>
+      </p:grpSpPr>
+      <p:sp>
+        <p:nvSpPr>
+          <p:cNvPr id="2" name="Title Placeholder 1">
+            <a:extLst>
+              <a:ext uri="{FF2B5EF4-FFF2-40B4-BE49-F238E27FC236}">
+                <a16:creationId xmlns:a16="http://schemas.microsoft.com/office/drawing/2014/main" id="{7A78C655-51BF-9D45-BF08-B850A8B05B4E}"/>
+              </a:ext>
+            </a:extLst>
+          </p:cNvPr>
+          <p:cNvSpPr>
+            <a:spLocks noGrp="1"/>
+          </p:cNvSpPr>
+          <p:nvPr>
+            <p:ph type="title"/>
+          </p:nvPr>
+        </p:nvSpPr>
+        <p:spPr>
+          <a:xfrm>
+            <a:off x="838200" y="365125"/>
+            <a:ext cx="10515600" cy="1325563"/>
+          </a:xfrm>
+          <a:prstGeom prst="rect">
+            <a:avLst/>
+          </a:prstGeom>
+        </p:spPr>
+        <p:txBody>
+          <a:bodyPr vert="horz" lIns="91440" tIns="45720" rIns="91440" bIns="45720" rtlCol="0" anchor="ctr">
+            <a:normAutofit/>
+          </a:bodyPr>
+          <a:lstStyle/>
+          <a:p>
+            <a:r>
+              <a:rPr lang="en-US"/>
+              <a:t>Click to edit Master title style</a:t>
+            </a:r>
+          </a:p>
+        </p:txBody>
+      </p:sp>
+      <p:sp>
+        <p:nvSpPr>
+          <p:cNvPr id="3" name="Text Placeholder 2">
+            <a:extLst>
+              <a:ext uri="{FF2B5EF4-FFF2-40B4-BE49-F238E27FC236}">
+                <a16:creationId xmlns:a16="http://schemas.microsoft.com/office/drawing/2014/main" id="{32A5D600-FB6F-E44F-9E8D-CB5236947E90}"/>
+              </a:ext>
+            </a:extLst>
+          </p:cNvPr>
+          <p:cNvSpPr>
+            <a:spLocks noGrp="1"/>
+          </p:cNvSpPr>
+          <p:nvPr>
+            <p:ph type="body" idx="1"/>
+          </p:nvPr>
+        </p:nvSpPr>
+        <p:spPr>
+          <a:xfrm>
+            <a:off x="838200" y="1825625"/>
+            <a:ext cx="10515600" cy="4351338"/>
+          </a:xfrm>
+          <a:prstGeom prst="rect">
+            <a:avLst/>
+          </a:prstGeom>
+        </p:spPr>
+        <p:txBody>
+          <a:bodyPr vert="horz" lIns="91440" tIns="45720" rIns="91440" bIns="45720" rtlCol="0">
+            <a:normAutofit/>
+          </a:bodyPr>
+          <a:lstStyle/>
+          <a:p>
+            <a:pPr lvl="0"/>
+            <a:r>
+              <a:rPr lang="en-US"/>
+              <a:t>Click to edit Master text styles</a:t>
+            </a:r>
+          </a:p>
+          <a:p>
+            <a:pPr lvl="1"/>
+            <a:r>
+              <a:rPr lang="en-US"/>
+              <a:t>Second level</a:t>
+            </a:r>
+          </a:p>
+          <a:p>
+            <a:pPr lvl="2"/>
+            <a:r>
+              <a:rPr lang="en-US"/>
+              <a:t>Third level</a:t>
+            </a:r>
+          </a:p>
+          <a:p>
+            <a:pPr lvl="3"/>
+            <a:r>
+              <a:rPr lang="en-US"/>
+              <a:t>Fourth level</a:t>
+            </a:r>
+          </a:p>
+          <a:p>
+            <a:pPr lvl="4"/>
+            <a:r>
+              <a:rPr lang="en-US"/>
+              <a:t>Fifth level</a:t>
+            </a:r>
+          </a:p>
+        </p:txBody>
+      </p:sp>
+      <p:sp>
+        <p:nvSpPr>
+          <p:cNvPr id="4" name="Date Placeholder 3">
+            <a:extLst>
+              <a:ext uri="{FF2B5EF4-FFF2-40B4-BE49-F238E27FC236}">
+                <a16:creationId xmlns:a16="http://schemas.microsoft.com/office/drawing/2014/main" id="{06F07A98-CE41-5246-A346-C772D80A9802}"/>
+              </a:ext>
+            </a:extLst>
+          </p:cNvPr>
+          <p:cNvSpPr>
+            <a:spLocks noGrp="1"/>
+          </p:cNvSpPr>
+          <p:nvPr>
+            <p:ph type="dt" sz="half" idx="2"/>
+          </p:nvPr>
+        </p:nvSpPr>
+        <p:spPr>
+          <a:xfrm>
+            <a:off x="838200" y="6356350"/>
+            <a:ext cx="2743200" cy="365125"/>
+          </a:xfrm>
+          <a:prstGeom prst="rect">
+            <a:avLst/>
+          </a:prstGeom>
+        </p:spPr>
+        <p:txBody>
+          <a:bodyPr vert="horz" lIns="91440" tIns="45720" rIns="91440" bIns="45720" rtlCol="0" anchor="ctr"/>
+          <a:lstStyle>
+            <a:lvl1pPr algn="l">
+              <a:defRPr sz="1200">
+                <a:solidFill>
+                  <a:schemeClr val="tx1">
+                    <a:tint val="75000"/>
+                  </a:schemeClr>
+                </a:solidFill>
+              </a:defRPr>
+            </a:lvl1pPr>
+          </a:lstStyle>
+          <a:p>
+            <a:fld id="{53FA46FA-1708-D043-B900-E932D5DF811C}" type="datetimeFigureOut">
+              <a:rPr lang="en-US" smtClean="0"/>
+              <a:t>7/18/19</a:t>
+            </a:fld>
+            <a:endParaRPr lang="en-US"/>
+          </a:p>
+        </p:txBody>
+      </p:sp>
+      <p:sp>
+        <p:nvSpPr>
+          <p:cNvPr id="5" name="Footer Placeholder 4">
+            <a:extLst>
+              <a:ext uri="{FF2B5EF4-FFF2-40B4-BE49-F238E27FC236}">
+                <a16:creationId xmlns:a16="http://schemas.microsoft.com/office/drawing/2014/main" id="{64163FE5-1C34-874F-B553-47F229344FA3}"/>
+              </a:ext>
+            </a:extLst>
+          </p:cNvPr>
+          <p:cNvSpPr>
+            <a:spLocks noGrp="1"/>
+          </p:cNvSpPr>
+          <p:nvPr>
+            <p:ph type="ftr" sz="quarter" idx="3"/>
+          </p:nvPr>
+        </p:nvSpPr>
+        <p:spPr>
+          <a:xfrm>
+            <a:off x="4038600" y="6356350"/>
+            <a:ext cx="4114800" cy="365125"/>
+          </a:xfrm>
+          <a:prstGeom prst="rect">
+            <a:avLst/>
+          </a:prstGeom>
+        </p:spPr>
+        <p:txBody>
+          <a:bodyPr vert="horz" lIns="91440" tIns="45720" rIns="91440" bIns="45720" rtlCol="0" anchor="ctr"/>
+          <a:lstStyle>
+            <a:lvl1pPr algn="ctr">
+              <a:defRPr sz="1200">
+                <a:solidFill>
+                  <a:schemeClr val="tx1">
+                    <a:tint val="75000"/>
+                  </a:schemeClr>
+                </a:solidFill>
+              </a:defRPr>
+            </a:lvl1pPr>
+          </a:lstStyle>
+          <a:p>
+            <a:endParaRPr lang="en-US"/>
+          </a:p>
+        </p:txBody>
+      </p:sp>
+      <p:sp>
+        <p:nvSpPr>
+          <p:cNvPr id="6" name="Slide Number Placeholder 5">
+            <a:extLst>
+              <a:ext uri="{FF2B5EF4-FFF2-40B4-BE49-F238E27FC236}">
+                <a16:creationId xmlns:a16="http://schemas.microsoft.com/office/drawing/2014/main" id="{022A187A-071F-8446-B0F2-BFDF9C569E02}"/>
+              </a:ext>
+            </a:extLst>
+          </p:cNvPr>
+          <p:cNvSpPr>
+            <a:spLocks noGrp="1"/>
+          </p:cNvSpPr>
+          <p:nvPr>
+            <p:ph type="sldNum" sz="quarter" idx="4"/>
+          </p:nvPr>
+        </p:nvSpPr>
+        <p:spPr>
+          <a:xfrm>
+            <a:off x="8610600" y="6356350"/>
+            <a:ext cx="2743200" cy="365125"/>
+          </a:xfrm>
+          <a:prstGeom prst="rect">
+            <a:avLst/>
+          </a:prstGeom>
+        </p:spPr>
+        <p:txBody>
+          <a:bodyPr vert="horz" lIns="91440" tIns="45720" rIns="91440" bIns="45720" rtlCol="0" anchor="ctr"/>
+          <a:lstStyle>
+            <a:lvl1pPr algn="r">
+              <a:defRPr sz="1200">
+                <a:solidFill>
+                  <a:schemeClr val="tx1">
+                    <a:tint val="75000"/>
+                  </a:schemeClr>
+                </a:solidFill>
+              </a:defRPr>
+            </a:lvl1pPr>
+          </a:lstStyle>
+          <a:p>
+            <a:fld id="{86CB4B4D-7CA3-9044-876B-883B54F8677D}" type="slidenum">
+              <a:rPr lang="en-US" smtClean="0"/>
+              <a:t>‹#›</a:t>
+            </a:fld>
+            <a:endParaRPr lang="en-US"/>
+          </a:p>
+        </p:txBody>
+      </p:sp>
+    </p:spTree>
+    <p:extLst>
+      <p:ext uri="{BB962C8B-B14F-4D97-AF65-F5344CB8AC3E}">
+        <p14:creationId xmlns:p14="http://schemas.microsoft.com/office/powerpoint/2010/main" val="3952980646"/>
+      </p:ext>
+    </p:extLst>
+  </p:cSld>
+  <p:clrMap bg1="lt1" tx1="dk1" bg2="lt2" tx2="dk2" accent1="accent1" accent2="accent2" accent3="accent3" accent4="accent4" accent5="accent5" accent6="accent6" hlink="hlink" folHlink="folHlink"/>
+  <p:sldLayoutIdLst>
+    <p:sldLayoutId id="2147483677" r:id="rId1"/>
+    <p:sldLayoutId id="2147483678" r:id="rId2"/>
+    <p:sldLayoutId id="2147483679" r:id="rId3"/>
+    <p:sldLayoutId id="2147483680" r:id="rId4"/>
+    <p:sldLayoutId id="2147483681" r:id="rId5"/>
+    <p:sldLayoutId id="2147483682" r:id="rId6"/>
+    <p:sldLayoutId id="2147483683" r:id="rId7"/>
+    <p:sldLayoutId id="2147483684" r:id="rId8"/>
+    <p:sldLayoutId id="2147483685" r:id="rId9"/>
+    <p:sldLayoutId id="2147483686" r:id="rId10"/>
+    <p:sldLayoutId id="2147483687" r:id="rId11"/>
+    <p:sldLayoutId id="2147483688" r:id="rId12"/>
+  </p:sldLayoutIdLst>
+  <p:txStyles>
+    <p:titleStyle>
+      <a:lvl1pPr algn="l" defTabSz="914400" rtl="0" eaLnBrk="1" latinLnBrk="0" hangingPunct="1">
+        <a:lnSpc>
+          <a:spcPct val="90000"/>
+        </a:lnSpc>
+        <a:spcBef>
+          <a:spcPct val="0"/>
+        </a:spcBef>
+        <a:buNone/>
+        <a:defRPr sz="4400" kern="1200">
+          <a:solidFill>
+            <a:schemeClr val="tx1"/>
+          </a:solidFill>
+          <a:latin typeface="+mj-lt"/>
+          <a:ea typeface="+mj-ea"/>
+          <a:cs typeface="+mj-cs"/>
+        </a:defRPr>
+      </a:lvl1pPr>
+    </p:titleStyle>
+    <p:bodyStyle>
+      <a:lvl1pPr marL="228600" indent="-228600" algn="l" defTabSz="914400" rtl="0" eaLnBrk="1" latinLnBrk="0" hangingPunct="1">
+        <a:lnSpc>
+          <a:spcPct val="90000"/>
+        </a:lnSpc>
+        <a:spcBef>
+          <a:spcPts val="1000"/>
+        </a:spcBef>
+        <a:buFont typeface="Arial" panose="020B0604020202020204" pitchFamily="34" charset="0"/>
+        <a:buChar char="•"/>
+        <a:defRPr sz="2800" kern="1200">
+          <a:solidFill>
+            <a:schemeClr val="tx1"/>
+          </a:solidFill>
+          <a:latin typeface="+mn-lt"/>
+          <a:ea typeface="+mn-ea"/>
+          <a:cs typeface="+mn-cs"/>
+        </a:defRPr>
+      </a:lvl1pPr>
+      <a:lvl2pPr marL="685800" indent="-228600" algn="l" defTabSz="914400" rtl="0" eaLnBrk="1" latinLnBrk="0" hangingPunct="1">
+        <a:lnSpc>
+          <a:spcPct val="90000"/>
+        </a:lnSpc>
+        <a:spcBef>
+          <a:spcPts val="500"/>
+        </a:spcBef>
+        <a:buFont typeface="Arial" panose="020B0604020202020204" pitchFamily="34" charset="0"/>
+        <a:buChar char="•"/>
+        <a:defRPr sz="2400" kern="1200">
+          <a:solidFill>
+            <a:schemeClr val="tx1"/>
+          </a:solidFill>
+          <a:latin typeface="+mn-lt"/>
+          <a:ea typeface="+mn-ea"/>
+          <a:cs typeface="+mn-cs"/>
+        </a:defRPr>
+      </a:lvl2pPr>
+      <a:lvl3pPr marL="1143000" indent="-228600" algn="l" defTabSz="914400" rtl="0" eaLnBrk="1" latinLnBrk="0" hangingPunct="1">
+        <a:lnSpc>
+          <a:spcPct val="90000"/>
+        </a:lnSpc>
+        <a:spcBef>
+          <a:spcPts val="500"/>
+        </a:spcBef>
+        <a:buFont typeface="Arial" panose="020B0604020202020204" pitchFamily="34" charset="0"/>
+        <a:buChar char="•"/>
+        <a:defRPr sz="2000" kern="1200">
+          <a:solidFill>
+            <a:schemeClr val="tx1"/>
+          </a:solidFill>
+          <a:latin typeface="+mn-lt"/>
+          <a:ea typeface="+mn-ea"/>
+          <a:cs typeface="+mn-cs"/>
+        </a:defRPr>
+      </a:lvl3pPr>
+      <a:lvl4pPr marL="1600200" indent="-228600" algn="l" defTabSz="914400" rtl="0" eaLnBrk="1" latinLnBrk="0" hangingPunct="1">
+        <a:lnSpc>
+          <a:spcPct val="90000"/>
+        </a:lnSpc>
+        <a:spcBef>
+          <a:spcPts val="500"/>
+        </a:spcBef>
+        <a:buFont typeface="Arial" panose="020B0604020202020204" pitchFamily="34" charset="0"/>
+        <a:buChar char="•"/>
+        <a:defRPr sz="1800" kern="1200">
+          <a:solidFill>
+            <a:schemeClr val="tx1"/>
+          </a:solidFill>
+          <a:latin typeface="+mn-lt"/>
+          <a:ea typeface="+mn-ea"/>
+          <a:cs typeface="+mn-cs"/>
+        </a:defRPr>
+      </a:lvl4pPr>
+      <a:lvl5pPr marL="2057400" indent="-228600" algn="l" defTabSz="914400" rtl="0" eaLnBrk="1" latinLnBrk="0" hangingPunct="1">
+        <a:lnSpc>
+          <a:spcPct val="90000"/>
+        </a:lnSpc>
+        <a:spcBef>
+          <a:spcPts val="500"/>
+        </a:spcBef>
+        <a:buFont typeface="Arial" panose="020B0604020202020204" pitchFamily="34" charset="0"/>
+        <a:buChar char="•"/>
+        <a:defRPr sz="1800" kern="1200">
+          <a:solidFill>
+            <a:schemeClr val="tx1"/>
+          </a:solidFill>
+          <a:latin typeface="+mn-lt"/>
+          <a:ea typeface="+mn-ea"/>
+          <a:cs typeface="+mn-cs"/>
+        </a:defRPr>
+      </a:lvl5pPr>
+      <a:lvl6pPr marL="2514600" indent="-228600" algn="l" defTabSz="914400" rtl="0" eaLnBrk="1" latinLnBrk="0" hangingPunct="1">
+        <a:lnSpc>
+          <a:spcPct val="90000"/>
+        </a:lnSpc>
+        <a:spcBef>
+          <a:spcPts val="500"/>
+        </a:spcBef>
+        <a:buFont typeface="Arial" panose="020B0604020202020204" pitchFamily="34" charset="0"/>
+        <a:buChar char="•"/>
+        <a:defRPr sz="1800" kern="1200">
+          <a:solidFill>
+            <a:schemeClr val="tx1"/>
+          </a:solidFill>
+          <a:latin typeface="+mn-lt"/>
+          <a:ea typeface="+mn-ea"/>
+          <a:cs typeface="+mn-cs"/>
+        </a:defRPr>
+      </a:lvl6pPr>
+      <a:lvl7pPr marL="2971800" indent="-228600" algn="l" defTabSz="914400" rtl="0" eaLnBrk="1" latinLnBrk="0" hangingPunct="1">
+        <a:lnSpc>
+          <a:spcPct val="90000"/>
+        </a:lnSpc>
+        <a:spcBef>
+          <a:spcPts val="500"/>
+        </a:spcBef>
+        <a:buFont typeface="Arial" panose="020B0604020202020204" pitchFamily="34" charset="0"/>
+        <a:buChar char="•"/>
+        <a:defRPr sz="1800" kern="1200">
+          <a:solidFill>
+            <a:schemeClr val="tx1"/>
+          </a:solidFill>
+          <a:latin typeface="+mn-lt"/>
+          <a:ea typeface="+mn-ea"/>
+          <a:cs typeface="+mn-cs"/>
+        </a:defRPr>
+      </a:lvl7pPr>
+      <a:lvl8pPr marL="3429000" indent="-228600" algn="l" defTabSz="914400" rtl="0" eaLnBrk="1" latinLnBrk="0" hangingPunct="1">
+        <a:lnSpc>
+          <a:spcPct val="90000"/>
+        </a:lnSpc>
+        <a:spcBef>
+          <a:spcPts val="500"/>
+        </a:spcBef>
+        <a:buFont typeface="Arial" panose="020B0604020202020204" pitchFamily="34" charset="0"/>
+        <a:buChar char="•"/>
+        <a:defRPr sz="1800" kern="1200">
+          <a:solidFill>
+            <a:schemeClr val="tx1"/>
+          </a:solidFill>
+          <a:latin typeface="+mn-lt"/>
+          <a:ea typeface="+mn-ea"/>
+          <a:cs typeface="+mn-cs"/>
+        </a:defRPr>
+      </a:lvl8pPr>
+      <a:lvl9pPr marL="3886200" indent="-228600" algn="l" defTabSz="914400" rtl="0" eaLnBrk="1" latinLnBrk="0" hangingPunct="1">
+        <a:lnSpc>
+          <a:spcPct val="90000"/>
+        </a:lnSpc>
+        <a:spcBef>
+          <a:spcPts val="500"/>
+        </a:spcBef>
+        <a:buFont typeface="Arial" panose="020B0604020202020204" pitchFamily="34" charset="0"/>
+        <a:buChar char="•"/>
+        <a:defRPr sz="1800" kern="1200">
+          <a:solidFill>
+            <a:schemeClr val="tx1"/>
+          </a:solidFill>
+          <a:latin typeface="+mn-lt"/>
+          <a:ea typeface="+mn-ea"/>
+          <a:cs typeface="+mn-cs"/>
+        </a:defRPr>
+      </a:lvl9pPr>
+    </p:bodyStyle>
+    <p:otherStyle>
+      <a:defPPr>
+        <a:defRPr lang="en-US"/>
+      </a:defPPr>
+      <a:lvl1pPr marL="0" algn="l" defTabSz="914400" rtl="0" eaLnBrk="1" latinLnBrk="0" hangingPunct="1">
+        <a:defRPr sz="1800" kern="1200">
+          <a:solidFill>
+            <a:schemeClr val="tx1"/>
+          </a:solidFill>
+          <a:latin typeface="+mn-lt"/>
+          <a:ea typeface="+mn-ea"/>
+          <a:cs typeface="+mn-cs"/>
+        </a:defRPr>
+      </a:lvl1pPr>
+      <a:lvl2pPr marL="457200" algn="l" defTabSz="914400" rtl="0" eaLnBrk="1" latinLnBrk="0" hangingPunct="1">
+        <a:defRPr sz="1800" kern="1200">
+          <a:solidFill>
+            <a:schemeClr val="tx1"/>
+          </a:solidFill>
+          <a:latin typeface="+mn-lt"/>
+          <a:ea typeface="+mn-ea"/>
+          <a:cs typeface="+mn-cs"/>
+        </a:defRPr>
+      </a:lvl2pPr>
+      <a:lvl3pPr marL="914400" algn="l" defTabSz="914400" rtl="0" eaLnBrk="1" latinLnBrk="0" hangingPunct="1">
+        <a:defRPr sz="1800" kern="1200">
+          <a:solidFill>
+            <a:schemeClr val="tx1"/>
+          </a:solidFill>
+          <a:latin typeface="+mn-lt"/>
+          <a:ea typeface="+mn-ea"/>
+          <a:cs typeface="+mn-cs"/>
+        </a:defRPr>
+      </a:lvl3pPr>
+      <a:lvl4pPr marL="1371600" algn="l" defTabSz="914400" rtl="0" eaLnBrk="1" latinLnBrk="0" hangingPunct="1">
+        <a:defRPr sz="1800" kern="1200">
+          <a:solidFill>
+            <a:schemeClr val="tx1"/>
+          </a:solidFill>
+          <a:latin typeface="+mn-lt"/>
+          <a:ea typeface="+mn-ea"/>
+          <a:cs typeface="+mn-cs"/>
+        </a:defRPr>
+      </a:lvl4pPr>
+      <a:lvl5pPr marL="1828800" algn="l" defTabSz="914400" rtl="0" eaLnBrk="1" latinLnBrk="0" hangingPunct="1">
+        <a:defRPr sz="1800" kern="1200">
+          <a:solidFill>
+            <a:schemeClr val="tx1"/>
+          </a:solidFill>
+          <a:latin typeface="+mn-lt"/>
+          <a:ea typeface="+mn-ea"/>
+          <a:cs typeface="+mn-cs"/>
+        </a:defRPr>
+      </a:lvl5pPr>
+      <a:lvl6pPr marL="2286000" algn="l" defTabSz="914400" rtl="0" eaLnBrk="1" latinLnBrk="0" hangingPunct="1">
+        <a:defRPr sz="1800" kern="1200">
+          <a:solidFill>
+            <a:schemeClr val="tx1"/>
+          </a:solidFill>
+          <a:latin typeface="+mn-lt"/>
+          <a:ea typeface="+mn-ea"/>
+          <a:cs typeface="+mn-cs"/>
+        </a:defRPr>
+      </a:lvl6pPr>
+      <a:lvl7pPr marL="2743200" algn="l" defTabSz="914400" rtl="0" eaLnBrk="1" latinLnBrk="0" hangingPunct="1">
+        <a:defRPr sz="1800" kern="1200">
+          <a:solidFill>
+            <a:schemeClr val="tx1"/>
+          </a:solidFill>
+          <a:latin typeface="+mn-lt"/>
+          <a:ea typeface="+mn-ea"/>
+          <a:cs typeface="+mn-cs"/>
+        </a:defRPr>
+      </a:lvl7pPr>
+      <a:lvl8pPr marL="3200400" algn="l" defTabSz="914400" rtl="0" eaLnBrk="1" latinLnBrk="0" hangingPunct="1">
+        <a:defRPr sz="1800" kern="1200">
+          <a:solidFill>
+            <a:schemeClr val="tx1"/>
+          </a:solidFill>
+          <a:latin typeface="+mn-lt"/>
+          <a:ea typeface="+mn-ea"/>
+          <a:cs typeface="+mn-cs"/>
+        </a:defRPr>
+      </a:lvl8pPr>
+      <a:lvl9pPr marL="3657600" algn="l" defTabSz="914400" rtl="0" eaLnBrk="1" latinLnBrk="0" hangingPunct="1">
+        <a:defRPr sz="1800" kern="1200">
+          <a:solidFill>
+            <a:schemeClr val="tx1"/>
+          </a:solidFill>
+          <a:latin typeface="+mn-lt"/>
+          <a:ea typeface="+mn-ea"/>
+          <a:cs typeface="+mn-cs"/>
+        </a:defRPr>
+      </a:lvl9pPr>
+    </p:otherStyle>
+  </p:txStyles>
+</p:sldMaster>
+</file>
+
 <file path=ppt/slides/slide1.xml><?xml version="1.0" encoding="utf-8"?>
 <p:sld xmlns:a="http://schemas.openxmlformats.org/drawingml/2006/main" xmlns:r="http://schemas.openxmlformats.org/officeDocument/2006/relationships" xmlns:p="http://schemas.openxmlformats.org/presentationml/2006/main" showMasterSp="0">
   <p:cSld>
@@ -3948,8 +7205,8 @@
         </p:nvSpPr>
         <p:spPr>
           <a:xfrm>
-            <a:off x="2370667" y="2187743"/>
-            <a:ext cx="5293449" cy="2482515"/>
+            <a:off x="0" y="2187575"/>
+            <a:ext cx="5294313" cy="2482850"/>
           </a:xfrm>
         </p:spPr>
         <p:txBody>
@@ -4011,57 +7268,8 @@
         </p:blipFill>
         <p:spPr>
           <a:xfrm>
-            <a:off x="838201" y="2743201"/>
-            <a:ext cx="1371600" cy="1371600"/>
-          </a:xfrm>
-          <a:prstGeom prst="rect">
-            <a:avLst/>
-          </a:prstGeom>
-        </p:spPr>
-      </p:pic>
-      <p:pic>
-        <p:nvPicPr>
-          <p:cNvPr id="8" name="Graphic 7">
-            <a:extLst>
-              <a:ext uri="{FF2B5EF4-FFF2-40B4-BE49-F238E27FC236}">
-                <a16:creationId xmlns:a16="http://schemas.microsoft.com/office/drawing/2014/main" id="{1F9C9140-853A-498A-8D80-BEB6649C18DA}"/>
-              </a:ext>
-              <a:ext uri="{C183D7F6-B498-43B3-948B-1728B52AA6E4}">
-                <adec:decorative xmlns:adec="http://schemas.microsoft.com/office/drawing/2017/decorative" val="1"/>
-              </a:ext>
-            </a:extLst>
-          </p:cNvPr>
-          <p:cNvPicPr>
-            <a:picLocks noGrp="1" noRot="1" noChangeAspect="1" noMove="1" noResize="1" noEditPoints="1" noAdjustHandles="1" noChangeArrowheads="1" noChangeShapeType="1" noCrop="1"/>
-          </p:cNvPicPr>
-          <p:nvPr>
-            <p:extLst>
-              <p:ext uri="{386F3935-93C4-4BCD-93E2-E3B085C9AB24}">
-                <p16:designElem xmlns:p16="http://schemas.microsoft.com/office/powerpoint/2015/main" val="1"/>
-              </p:ext>
-            </p:extLst>
-          </p:nvPr>
-        </p:nvPicPr>
-        <p:blipFill>
-          <a:blip r:embed="rId2">
-            <a:alphaModFix amt="15000"/>
-            <a:extLst>
-              <a:ext uri="{28A0092B-C50C-407E-A947-70E740481C1C}">
-                <a14:useLocalDpi xmlns:a14="http://schemas.microsoft.com/office/drawing/2010/main" val="0"/>
-              </a:ext>
-              <a:ext uri="{96DAC541-7B7A-43D3-8B79-37D633B846F1}">
-                <asvg:svgBlip xmlns:asvg="http://schemas.microsoft.com/office/drawing/2016/SVG/main" r:embed="rId3"/>
-              </a:ext>
-            </a:extLst>
-          </a:blip>
-          <a:stretch>
-            <a:fillRect/>
-          </a:stretch>
-        </p:blipFill>
-        <p:spPr>
-          <a:xfrm>
-            <a:off x="6641431" y="816337"/>
-            <a:ext cx="5225327" cy="5225327"/>
+            <a:off x="5294313" y="304595"/>
+            <a:ext cx="6248809" cy="6248809"/>
           </a:xfrm>
           <a:prstGeom prst="rect">
             <a:avLst/>
@@ -4161,7 +7369,9 @@
           </a:xfrm>
         </p:spPr>
         <p:txBody>
-          <a:bodyPr/>
+          <a:bodyPr>
+            <a:normAutofit fontScale="90000"/>
+          </a:bodyPr>
           <a:lstStyle/>
           <a:p>
             <a:r>
@@ -4693,7 +7903,9 @@
           </a:xfrm>
         </p:spPr>
         <p:txBody>
-          <a:bodyPr/>
+          <a:bodyPr>
+            <a:normAutofit fontScale="90000"/>
+          </a:bodyPr>
           <a:lstStyle/>
           <a:p>
             <a:r>
@@ -6192,7 +9404,9 @@
           </a:xfrm>
         </p:spPr>
         <p:txBody>
-          <a:bodyPr/>
+          <a:bodyPr>
+            <a:normAutofit fontScale="90000"/>
+          </a:bodyPr>
           <a:lstStyle/>
           <a:p>
             <a:r>
@@ -7330,7 +10544,9 @@
           </a:xfrm>
         </p:spPr>
         <p:txBody>
-          <a:bodyPr/>
+          <a:bodyPr>
+            <a:normAutofit fontScale="90000"/>
+          </a:bodyPr>
           <a:lstStyle/>
           <a:p>
             <a:r>
@@ -7979,7 +11195,9 @@
           </a:xfrm>
         </p:spPr>
         <p:txBody>
-          <a:bodyPr/>
+          <a:bodyPr>
+            <a:normAutofit fontScale="90000"/>
+          </a:bodyPr>
           <a:lstStyle/>
           <a:p>
             <a:r>
@@ -8785,7 +12003,9 @@
           </a:xfrm>
         </p:spPr>
         <p:txBody>
-          <a:bodyPr/>
+          <a:bodyPr>
+            <a:normAutofit fontScale="90000"/>
+          </a:bodyPr>
           <a:lstStyle/>
           <a:p>
             <a:r>
@@ -9563,7 +12783,9 @@
           </a:xfrm>
         </p:spPr>
         <p:txBody>
-          <a:bodyPr/>
+          <a:bodyPr>
+            <a:normAutofit fontScale="90000"/>
+          </a:bodyPr>
           <a:lstStyle/>
           <a:p>
             <a:r>
@@ -9899,7 +13121,9 @@
           </a:xfrm>
         </p:spPr>
         <p:txBody>
-          <a:bodyPr/>
+          <a:bodyPr>
+            <a:normAutofit fontScale="90000"/>
+          </a:bodyPr>
           <a:lstStyle/>
           <a:p>
             <a:r>
@@ -9933,7 +13157,7 @@
         </p:spPr>
         <p:txBody>
           <a:bodyPr>
-            <a:normAutofit fontScale="92500" lnSpcReduction="10000"/>
+            <a:normAutofit/>
           </a:bodyPr>
           <a:lstStyle/>
           <a:p>
@@ -10480,7 +13704,9 @@
           </a:xfrm>
         </p:spPr>
         <p:txBody>
-          <a:bodyPr/>
+          <a:bodyPr>
+            <a:normAutofit fontScale="90000"/>
+          </a:bodyPr>
           <a:lstStyle/>
           <a:p>
             <a:r>
@@ -11284,7 +14510,9 @@
           </a:xfrm>
         </p:spPr>
         <p:txBody>
-          <a:bodyPr/>
+          <a:bodyPr>
+            <a:normAutofit fontScale="90000"/>
+          </a:bodyPr>
           <a:lstStyle/>
           <a:p>
             <a:r>
@@ -11530,7 +14758,9 @@
           </a:xfrm>
         </p:spPr>
         <p:txBody>
-          <a:bodyPr/>
+          <a:bodyPr>
+            <a:normAutofit fontScale="90000"/>
+          </a:bodyPr>
           <a:lstStyle/>
           <a:p>
             <a:r>
@@ -11907,7 +15137,9 @@
           </a:xfrm>
         </p:spPr>
         <p:txBody>
-          <a:bodyPr/>
+          <a:bodyPr>
+            <a:normAutofit fontScale="90000"/>
+          </a:bodyPr>
           <a:lstStyle/>
           <a:p>
             <a:r>
@@ -11941,7 +15173,7 @@
         </p:spPr>
         <p:txBody>
           <a:bodyPr>
-            <a:normAutofit lnSpcReduction="10000"/>
+            <a:normAutofit/>
           </a:bodyPr>
           <a:lstStyle/>
           <a:p>
@@ -12154,7 +15386,9 @@
           </a:xfrm>
         </p:spPr>
         <p:txBody>
-          <a:bodyPr/>
+          <a:bodyPr>
+            <a:normAutofit fontScale="90000"/>
+          </a:bodyPr>
           <a:lstStyle/>
           <a:p>
             <a:r>
@@ -15380,7 +18614,9 @@
           </a:xfrm>
         </p:spPr>
         <p:txBody>
-          <a:bodyPr/>
+          <a:bodyPr>
+            <a:normAutofit fontScale="90000"/>
+          </a:bodyPr>
           <a:lstStyle/>
           <a:p>
             <a:r>
@@ -16022,7 +19258,9 @@
           </a:xfrm>
         </p:spPr>
         <p:txBody>
-          <a:bodyPr/>
+          <a:bodyPr>
+            <a:normAutofit fontScale="90000"/>
+          </a:bodyPr>
           <a:lstStyle/>
           <a:p>
             <a:r>
@@ -16356,7 +19594,9 @@
           </a:xfrm>
         </p:spPr>
         <p:txBody>
-          <a:bodyPr/>
+          <a:bodyPr>
+            <a:normAutofit fontScale="90000"/>
+          </a:bodyPr>
           <a:lstStyle/>
           <a:p>
             <a:r>
@@ -16670,7 +19910,9 @@
           </a:xfrm>
         </p:spPr>
         <p:txBody>
-          <a:bodyPr/>
+          <a:bodyPr>
+            <a:normAutofit fontScale="90000"/>
+          </a:bodyPr>
           <a:lstStyle/>
           <a:p>
             <a:r>
@@ -16857,7 +20099,9 @@
           </a:xfrm>
         </p:spPr>
         <p:txBody>
-          <a:bodyPr/>
+          <a:bodyPr>
+            <a:normAutofit fontScale="90000"/>
+          </a:bodyPr>
           <a:lstStyle/>
           <a:p>
             <a:r>
@@ -17584,7 +20828,9 @@
           </a:xfrm>
         </p:spPr>
         <p:txBody>
-          <a:bodyPr/>
+          <a:bodyPr>
+            <a:normAutofit fontScale="90000"/>
+          </a:bodyPr>
           <a:lstStyle/>
           <a:p>
             <a:r>
@@ -18749,7 +21995,9 @@
           </a:xfrm>
         </p:spPr>
         <p:txBody>
-          <a:bodyPr/>
+          <a:bodyPr>
+            <a:normAutofit fontScale="90000"/>
+          </a:bodyPr>
           <a:lstStyle/>
           <a:p>
             <a:r>
@@ -20141,7 +23389,9 @@
           </a:xfrm>
         </p:spPr>
         <p:txBody>
-          <a:bodyPr/>
+          <a:bodyPr>
+            <a:normAutofit fontScale="90000"/>
+          </a:bodyPr>
           <a:lstStyle/>
           <a:p>
             <a:r>
@@ -21487,7 +24737,9 @@
           </a:xfrm>
         </p:spPr>
         <p:txBody>
-          <a:bodyPr/>
+          <a:bodyPr>
+            <a:normAutofit fontScale="90000"/>
+          </a:bodyPr>
           <a:lstStyle/>
           <a:p>
             <a:r>
@@ -22526,7 +25778,9 @@
           </a:xfrm>
         </p:spPr>
         <p:txBody>
-          <a:bodyPr/>
+          <a:bodyPr>
+            <a:normAutofit fontScale="90000"/>
+          </a:bodyPr>
           <a:lstStyle/>
           <a:p>
             <a:r>
@@ -22719,7 +25973,7 @@
         </p:spPr>
         <p:txBody>
           <a:bodyPr>
-            <a:normAutofit fontScale="70000" lnSpcReduction="20000"/>
+            <a:normAutofit fontScale="92500" lnSpcReduction="10000"/>
           </a:bodyPr>
           <a:lstStyle/>
           <a:p>
@@ -24358,4 +27612,299 @@
     </a:ext>
   </a:extLst>
 </a:theme>
+</file>
+
+<file path=ppt/theme/theme3.xml><?xml version="1.0" encoding="utf-8"?>
+<a:theme xmlns:a="http://schemas.openxmlformats.org/drawingml/2006/main" name="Office Theme">
+  <a:themeElements>
+    <a:clrScheme name="Office">
+      <a:dk1>
+        <a:sysClr val="windowText" lastClr="000000"/>
+      </a:dk1>
+      <a:lt1>
+        <a:sysClr val="window" lastClr="FFFFFF"/>
+      </a:lt1>
+      <a:dk2>
+        <a:srgbClr val="44546A"/>
+      </a:dk2>
+      <a:lt2>
+        <a:srgbClr val="E7E6E6"/>
+      </a:lt2>
+      <a:accent1>
+        <a:srgbClr val="4472C4"/>
+      </a:accent1>
+      <a:accent2>
+        <a:srgbClr val="ED7D31"/>
+      </a:accent2>
+      <a:accent3>
+        <a:srgbClr val="A5A5A5"/>
+      </a:accent3>
+      <a:accent4>
+        <a:srgbClr val="FFC000"/>
+      </a:accent4>
+      <a:accent5>
+        <a:srgbClr val="5B9BD5"/>
+      </a:accent5>
+      <a:accent6>
+        <a:srgbClr val="70AD47"/>
+      </a:accent6>
+      <a:hlink>
+        <a:srgbClr val="0563C1"/>
+      </a:hlink>
+      <a:folHlink>
+        <a:srgbClr val="954F72"/>
+      </a:folHlink>
+    </a:clrScheme>
+    <a:fontScheme name="Office">
+      <a:majorFont>
+        <a:latin typeface="Calibri Light" panose="020F0302020204030204"/>
+        <a:ea typeface=""/>
+        <a:cs typeface=""/>
+        <a:font script="Jpan" typeface="游ゴシック Light"/>
+        <a:font script="Hang" typeface="맑은 고딕"/>
+        <a:font script="Hans" typeface="等线 Light"/>
+        <a:font script="Hant" typeface="新細明體"/>
+        <a:font script="Arab" typeface="Times New Roman"/>
+        <a:font script="Hebr" typeface="Times New Roman"/>
+        <a:font script="Thai" typeface="Angsana New"/>
+        <a:font script="Ethi" typeface="Nyala"/>
+        <a:font script="Beng" typeface="Vrinda"/>
+        <a:font script="Gujr" typeface="Shruti"/>
+        <a:font script="Khmr" typeface="MoolBoran"/>
+        <a:font script="Knda" typeface="Tunga"/>
+        <a:font script="Guru" typeface="Raavi"/>
+        <a:font script="Cans" typeface="Euphemia"/>
+        <a:font script="Cher" typeface="Plantagenet Cherokee"/>
+        <a:font script="Yiii" typeface="Microsoft Yi Baiti"/>
+        <a:font script="Tibt" typeface="Microsoft Himalaya"/>
+        <a:font script="Thaa" typeface="MV Boli"/>
+        <a:font script="Deva" typeface="Mangal"/>
+        <a:font script="Telu" typeface="Gautami"/>
+        <a:font script="Taml" typeface="Latha"/>
+        <a:font script="Syrc" typeface="Estrangelo Edessa"/>
+        <a:font script="Orya" typeface="Kalinga"/>
+        <a:font script="Mlym" typeface="Kartika"/>
+        <a:font script="Laoo" typeface="DokChampa"/>
+        <a:font script="Sinh" typeface="Iskoola Pota"/>
+        <a:font script="Mong" typeface="Mongolian Baiti"/>
+        <a:font script="Viet" typeface="Times New Roman"/>
+        <a:font script="Uigh" typeface="Microsoft Uighur"/>
+        <a:font script="Geor" typeface="Sylfaen"/>
+        <a:font script="Armn" typeface="Arial"/>
+        <a:font script="Bugi" typeface="Leelawadee UI"/>
+        <a:font script="Bopo" typeface="Microsoft JhengHei"/>
+        <a:font script="Java" typeface="Javanese Text"/>
+        <a:font script="Lisu" typeface="Segoe UI"/>
+        <a:font script="Mymr" typeface="Myanmar Text"/>
+        <a:font script="Nkoo" typeface="Ebrima"/>
+        <a:font script="Olck" typeface="Nirmala UI"/>
+        <a:font script="Osma" typeface="Ebrima"/>
+        <a:font script="Phag" typeface="Phagspa"/>
+        <a:font script="Syrn" typeface="Estrangelo Edessa"/>
+        <a:font script="Syrj" typeface="Estrangelo Edessa"/>
+        <a:font script="Syre" typeface="Estrangelo Edessa"/>
+        <a:font script="Sora" typeface="Nirmala UI"/>
+        <a:font script="Tale" typeface="Microsoft Tai Le"/>
+        <a:font script="Talu" typeface="Microsoft New Tai Lue"/>
+        <a:font script="Tfng" typeface="Ebrima"/>
+      </a:majorFont>
+      <a:minorFont>
+        <a:latin typeface="Calibri" panose="020F0502020204030204"/>
+        <a:ea typeface=""/>
+        <a:cs typeface=""/>
+        <a:font script="Jpan" typeface="游ゴシック"/>
+        <a:font script="Hang" typeface="맑은 고딕"/>
+        <a:font script="Hans" typeface="等线"/>
+        <a:font script="Hant" typeface="新細明體"/>
+        <a:font script="Arab" typeface="Arial"/>
+        <a:font script="Hebr" typeface="Arial"/>
+        <a:font script="Thai" typeface="Cordia New"/>
+        <a:font script="Ethi" typeface="Nyala"/>
+        <a:font script="Beng" typeface="Vrinda"/>
+        <a:font script="Gujr" typeface="Shruti"/>
+        <a:font script="Khmr" typeface="DaunPenh"/>
+        <a:font script="Knda" typeface="Tunga"/>
+        <a:font script="Guru" typeface="Raavi"/>
+        <a:font script="Cans" typeface="Euphemia"/>
+        <a:font script="Cher" typeface="Plantagenet Cherokee"/>
+        <a:font script="Yiii" typeface="Microsoft Yi Baiti"/>
+        <a:font script="Tibt" typeface="Microsoft Himalaya"/>
+        <a:font script="Thaa" typeface="MV Boli"/>
+        <a:font script="Deva" typeface="Mangal"/>
+        <a:font script="Telu" typeface="Gautami"/>
+        <a:font script="Taml" typeface="Latha"/>
+        <a:font script="Syrc" typeface="Estrangelo Edessa"/>
+        <a:font script="Orya" typeface="Kalinga"/>
+        <a:font script="Mlym" typeface="Kartika"/>
+        <a:font script="Laoo" typeface="DokChampa"/>
+        <a:font script="Sinh" typeface="Iskoola Pota"/>
+        <a:font script="Mong" typeface="Mongolian Baiti"/>
+        <a:font script="Viet" typeface="Arial"/>
+        <a:font script="Uigh" typeface="Microsoft Uighur"/>
+        <a:font script="Geor" typeface="Sylfaen"/>
+        <a:font script="Armn" typeface="Arial"/>
+        <a:font script="Bugi" typeface="Leelawadee UI"/>
+        <a:font script="Bopo" typeface="Microsoft JhengHei"/>
+        <a:font script="Java" typeface="Javanese Text"/>
+        <a:font script="Lisu" typeface="Segoe UI"/>
+        <a:font script="Mymr" typeface="Myanmar Text"/>
+        <a:font script="Nkoo" typeface="Ebrima"/>
+        <a:font script="Olck" typeface="Nirmala UI"/>
+        <a:font script="Osma" typeface="Ebrima"/>
+        <a:font script="Phag" typeface="Phagspa"/>
+        <a:font script="Syrn" typeface="Estrangelo Edessa"/>
+        <a:font script="Syrj" typeface="Estrangelo Edessa"/>
+        <a:font script="Syre" typeface="Estrangelo Edessa"/>
+        <a:font script="Sora" typeface="Nirmala UI"/>
+        <a:font script="Tale" typeface="Microsoft Tai Le"/>
+        <a:font script="Talu" typeface="Microsoft New Tai Lue"/>
+        <a:font script="Tfng" typeface="Ebrima"/>
+      </a:minorFont>
+    </a:fontScheme>
+    <a:fmtScheme name="Office">
+      <a:fillStyleLst>
+        <a:solidFill>
+          <a:schemeClr val="phClr"/>
+        </a:solidFill>
+        <a:gradFill rotWithShape="1">
+          <a:gsLst>
+            <a:gs pos="0">
+              <a:schemeClr val="phClr">
+                <a:lumMod val="110000"/>
+                <a:satMod val="105000"/>
+                <a:tint val="67000"/>
+              </a:schemeClr>
+            </a:gs>
+            <a:gs pos="50000">
+              <a:schemeClr val="phClr">
+                <a:lumMod val="105000"/>
+                <a:satMod val="103000"/>
+                <a:tint val="73000"/>
+              </a:schemeClr>
+            </a:gs>
+            <a:gs pos="100000">
+              <a:schemeClr val="phClr">
+                <a:lumMod val="105000"/>
+                <a:satMod val="109000"/>
+                <a:tint val="81000"/>
+              </a:schemeClr>
+            </a:gs>
+          </a:gsLst>
+          <a:lin ang="5400000" scaled="0"/>
+        </a:gradFill>
+        <a:gradFill rotWithShape="1">
+          <a:gsLst>
+            <a:gs pos="0">
+              <a:schemeClr val="phClr">
+                <a:satMod val="103000"/>
+                <a:lumMod val="102000"/>
+                <a:tint val="94000"/>
+              </a:schemeClr>
+            </a:gs>
+            <a:gs pos="50000">
+              <a:schemeClr val="phClr">
+                <a:satMod val="110000"/>
+                <a:lumMod val="100000"/>
+                <a:shade val="100000"/>
+              </a:schemeClr>
+            </a:gs>
+            <a:gs pos="100000">
+              <a:schemeClr val="phClr">
+                <a:lumMod val="99000"/>
+                <a:satMod val="120000"/>
+                <a:shade val="78000"/>
+              </a:schemeClr>
+            </a:gs>
+          </a:gsLst>
+          <a:lin ang="5400000" scaled="0"/>
+        </a:gradFill>
+      </a:fillStyleLst>
+      <a:lnStyleLst>
+        <a:ln w="6350" cap="flat" cmpd="sng" algn="ctr">
+          <a:solidFill>
+            <a:schemeClr val="phClr"/>
+          </a:solidFill>
+          <a:prstDash val="solid"/>
+          <a:miter lim="800000"/>
+        </a:ln>
+        <a:ln w="12700" cap="flat" cmpd="sng" algn="ctr">
+          <a:solidFill>
+            <a:schemeClr val="phClr"/>
+          </a:solidFill>
+          <a:prstDash val="solid"/>
+          <a:miter lim="800000"/>
+        </a:ln>
+        <a:ln w="19050" cap="flat" cmpd="sng" algn="ctr">
+          <a:solidFill>
+            <a:schemeClr val="phClr"/>
+          </a:solidFill>
+          <a:prstDash val="solid"/>
+          <a:miter lim="800000"/>
+        </a:ln>
+      </a:lnStyleLst>
+      <a:effectStyleLst>
+        <a:effectStyle>
+          <a:effectLst/>
+        </a:effectStyle>
+        <a:effectStyle>
+          <a:effectLst/>
+        </a:effectStyle>
+        <a:effectStyle>
+          <a:effectLst>
+            <a:outerShdw blurRad="57150" dist="19050" dir="5400000" algn="ctr" rotWithShape="0">
+              <a:srgbClr val="000000">
+                <a:alpha val="63000"/>
+              </a:srgbClr>
+            </a:outerShdw>
+          </a:effectLst>
+        </a:effectStyle>
+      </a:effectStyleLst>
+      <a:bgFillStyleLst>
+        <a:solidFill>
+          <a:schemeClr val="phClr"/>
+        </a:solidFill>
+        <a:solidFill>
+          <a:schemeClr val="phClr">
+            <a:tint val="95000"/>
+            <a:satMod val="170000"/>
+          </a:schemeClr>
+        </a:solidFill>
+        <a:gradFill rotWithShape="1">
+          <a:gsLst>
+            <a:gs pos="0">
+              <a:schemeClr val="phClr">
+                <a:tint val="93000"/>
+                <a:satMod val="150000"/>
+                <a:shade val="98000"/>
+                <a:lumMod val="102000"/>
+              </a:schemeClr>
+            </a:gs>
+            <a:gs pos="50000">
+              <a:schemeClr val="phClr">
+                <a:tint val="98000"/>
+                <a:satMod val="130000"/>
+                <a:shade val="90000"/>
+                <a:lumMod val="103000"/>
+              </a:schemeClr>
+            </a:gs>
+            <a:gs pos="100000">
+              <a:schemeClr val="phClr">
+                <a:shade val="63000"/>
+                <a:satMod val="120000"/>
+              </a:schemeClr>
+            </a:gs>
+          </a:gsLst>
+          <a:lin ang="5400000" scaled="0"/>
+        </a:gradFill>
+      </a:bgFillStyleLst>
+    </a:fmtScheme>
+  </a:themeElements>
+  <a:objectDefaults/>
+  <a:extraClrSchemeLst/>
+  <a:extLst>
+    <a:ext uri="{05A4C25C-085E-4340-85A3-A5531E510DB2}">
+      <thm15:themeFamily xmlns:thm15="http://schemas.microsoft.com/office/thememl/2012/main" name="Office Theme" id="{62F939B6-93AF-4DB8-9C6B-D6C7DFDC589F}" vid="{4A3C46E8-61CC-4603-A589-7422A47A8E4A}"/>
+    </a:ext>
+  </a:extLst>
+</a:theme>
 </file>
</xml_diff>